<commit_message>
updated slides for diagrams, and diagram images
</commit_message>
<xml_diff>
--- a/docs/diagrams/Diagrams.pptx
+++ b/docs/diagrams/Diagrams.pptx
@@ -216,7 +216,7 @@
           <a:p>
             <a:fld id="{F5CC4B3F-88C1-4FFA-B1B6-F41C21DC6924}" type="datetimeFigureOut">
               <a:rPr lang="en-US" smtClean="0"/>
-              <a:t>10/18/2016</a:t>
+              <a:t>10/19/2016</a:t>
             </a:fld>
             <a:endParaRPr lang="en-US"/>
           </a:p>
@@ -483,6 +483,94 @@
 </p:notesMaster>
 </file>
 
+<file path=ppt/notesSlides/notesSlide1.xml><?xml version="1.0" encoding="utf-8"?>
+<p:notes xmlns:a="http://schemas.openxmlformats.org/drawingml/2006/main" xmlns:r="http://schemas.openxmlformats.org/officeDocument/2006/relationships" xmlns:p="http://schemas.openxmlformats.org/presentationml/2006/main">
+  <p:cSld>
+    <p:spTree>
+      <p:nvGrpSpPr>
+        <p:cNvPr id="1" name=""/>
+        <p:cNvGrpSpPr/>
+        <p:nvPr/>
+      </p:nvGrpSpPr>
+      <p:grpSpPr>
+        <a:xfrm>
+          <a:off x="0" y="0"/>
+          <a:ext cx="0" cy="0"/>
+          <a:chOff x="0" y="0"/>
+          <a:chExt cx="0" cy="0"/>
+        </a:xfrm>
+      </p:grpSpPr>
+      <p:sp>
+        <p:nvSpPr>
+          <p:cNvPr id="2" name="Slide Image Placeholder 1"/>
+          <p:cNvSpPr>
+            <a:spLocks noGrp="1" noRot="1" noChangeAspect="1"/>
+          </p:cNvSpPr>
+          <p:nvPr>
+            <p:ph type="sldImg"/>
+          </p:nvPr>
+        </p:nvSpPr>
+        <p:spPr/>
+      </p:sp>
+      <p:sp>
+        <p:nvSpPr>
+          <p:cNvPr id="3" name="Notes Placeholder 2"/>
+          <p:cNvSpPr>
+            <a:spLocks noGrp="1"/>
+          </p:cNvSpPr>
+          <p:nvPr>
+            <p:ph type="body" idx="1"/>
+          </p:nvPr>
+        </p:nvSpPr>
+        <p:spPr/>
+        <p:txBody>
+          <a:bodyPr/>
+          <a:lstStyle/>
+          <a:p>
+            <a:r>
+              <a:rPr lang="en-US"/>
+              <a:t>No change</a:t>
+            </a:r>
+            <a:endParaRPr lang="en-US" dirty="0"/>
+          </a:p>
+        </p:txBody>
+      </p:sp>
+      <p:sp>
+        <p:nvSpPr>
+          <p:cNvPr id="4" name="Slide Number Placeholder 3"/>
+          <p:cNvSpPr>
+            <a:spLocks noGrp="1"/>
+          </p:cNvSpPr>
+          <p:nvPr>
+            <p:ph type="sldNum" sz="quarter" idx="10"/>
+          </p:nvPr>
+        </p:nvSpPr>
+        <p:spPr/>
+        <p:txBody>
+          <a:bodyPr/>
+          <a:lstStyle/>
+          <a:p>
+            <a:fld id="{5A7AB025-77E3-4BD1-A2FD-B3183DBA47A3}" type="slidenum">
+              <a:rPr lang="en-US" smtClean="0"/>
+              <a:t>2</a:t>
+            </a:fld>
+            <a:endParaRPr lang="en-US"/>
+          </a:p>
+        </p:txBody>
+      </p:sp>
+    </p:spTree>
+    <p:extLst>
+      <p:ext uri="{BB962C8B-B14F-4D97-AF65-F5344CB8AC3E}">
+        <p14:creationId xmlns:p14="http://schemas.microsoft.com/office/powerpoint/2010/main" val="1791593621"/>
+      </p:ext>
+    </p:extLst>
+  </p:cSld>
+  <p:clrMapOvr>
+    <a:masterClrMapping/>
+  </p:clrMapOvr>
+</p:notes>
+</file>
+
 <file path=ppt/slideLayouts/slideLayout1.xml><?xml version="1.0" encoding="utf-8"?>
 <p:sldLayout xmlns:a="http://schemas.openxmlformats.org/drawingml/2006/main" xmlns:r="http://schemas.openxmlformats.org/officeDocument/2006/relationships" xmlns:p="http://schemas.openxmlformats.org/presentationml/2006/main" type="title" preserve="1">
   <p:cSld name="Title Slide">
@@ -662,7 +750,7 @@
           <a:p>
             <a:fld id="{78C97017-6FC3-485B-9764-EAC9E56C1D49}" type="datetimeFigureOut">
               <a:rPr lang="en-US" smtClean="0"/>
-              <a:t>10/18/2016</a:t>
+              <a:t>10/19/2016</a:t>
             </a:fld>
             <a:endParaRPr lang="en-US"/>
           </a:p>
@@ -830,7 +918,7 @@
           <a:p>
             <a:fld id="{78C97017-6FC3-485B-9764-EAC9E56C1D49}" type="datetimeFigureOut">
               <a:rPr lang="en-US" smtClean="0"/>
-              <a:t>10/18/2016</a:t>
+              <a:t>10/19/2016</a:t>
             </a:fld>
             <a:endParaRPr lang="en-US"/>
           </a:p>
@@ -1008,7 +1096,7 @@
           <a:p>
             <a:fld id="{78C97017-6FC3-485B-9764-EAC9E56C1D49}" type="datetimeFigureOut">
               <a:rPr lang="en-US" smtClean="0"/>
-              <a:t>10/18/2016</a:t>
+              <a:t>10/19/2016</a:t>
             </a:fld>
             <a:endParaRPr lang="en-US"/>
           </a:p>
@@ -1176,7 +1264,7 @@
           <a:p>
             <a:fld id="{78C97017-6FC3-485B-9764-EAC9E56C1D49}" type="datetimeFigureOut">
               <a:rPr lang="en-US" smtClean="0"/>
-              <a:t>10/18/2016</a:t>
+              <a:t>10/19/2016</a:t>
             </a:fld>
             <a:endParaRPr lang="en-US"/>
           </a:p>
@@ -1421,7 +1509,7 @@
           <a:p>
             <a:fld id="{78C97017-6FC3-485B-9764-EAC9E56C1D49}" type="datetimeFigureOut">
               <a:rPr lang="en-US" smtClean="0"/>
-              <a:t>10/18/2016</a:t>
+              <a:t>10/19/2016</a:t>
             </a:fld>
             <a:endParaRPr lang="en-US"/>
           </a:p>
@@ -1706,7 +1794,7 @@
           <a:p>
             <a:fld id="{78C97017-6FC3-485B-9764-EAC9E56C1D49}" type="datetimeFigureOut">
               <a:rPr lang="en-US" smtClean="0"/>
-              <a:t>10/18/2016</a:t>
+              <a:t>10/19/2016</a:t>
             </a:fld>
             <a:endParaRPr lang="en-US"/>
           </a:p>
@@ -2125,7 +2213,7 @@
           <a:p>
             <a:fld id="{78C97017-6FC3-485B-9764-EAC9E56C1D49}" type="datetimeFigureOut">
               <a:rPr lang="en-US" smtClean="0"/>
-              <a:t>10/18/2016</a:t>
+              <a:t>10/19/2016</a:t>
             </a:fld>
             <a:endParaRPr lang="en-US"/>
           </a:p>
@@ -2242,7 +2330,7 @@
           <a:p>
             <a:fld id="{78C97017-6FC3-485B-9764-EAC9E56C1D49}" type="datetimeFigureOut">
               <a:rPr lang="en-US" smtClean="0"/>
-              <a:t>10/18/2016</a:t>
+              <a:t>10/19/2016</a:t>
             </a:fld>
             <a:endParaRPr lang="en-US"/>
           </a:p>
@@ -2337,7 +2425,7 @@
           <a:p>
             <a:fld id="{78C97017-6FC3-485B-9764-EAC9E56C1D49}" type="datetimeFigureOut">
               <a:rPr lang="en-US" smtClean="0"/>
-              <a:t>10/18/2016</a:t>
+              <a:t>10/19/2016</a:t>
             </a:fld>
             <a:endParaRPr lang="en-US"/>
           </a:p>
@@ -2612,7 +2700,7 @@
           <a:p>
             <a:fld id="{78C97017-6FC3-485B-9764-EAC9E56C1D49}" type="datetimeFigureOut">
               <a:rPr lang="en-US" smtClean="0"/>
-              <a:t>10/18/2016</a:t>
+              <a:t>10/19/2016</a:t>
             </a:fld>
             <a:endParaRPr lang="en-US"/>
           </a:p>
@@ -2864,7 +2952,7 @@
           <a:p>
             <a:fld id="{78C97017-6FC3-485B-9764-EAC9E56C1D49}" type="datetimeFigureOut">
               <a:rPr lang="en-US" smtClean="0"/>
-              <a:t>10/18/2016</a:t>
+              <a:t>10/19/2016</a:t>
             </a:fld>
             <a:endParaRPr lang="en-US"/>
           </a:p>
@@ -3075,7 +3163,7 @@
           <a:p>
             <a:fld id="{78C97017-6FC3-485B-9764-EAC9E56C1D49}" type="datetimeFigureOut">
               <a:rPr lang="en-US" smtClean="0"/>
-              <a:t>10/18/2016</a:t>
+              <a:t>10/19/2016</a:t>
             </a:fld>
             <a:endParaRPr lang="en-US"/>
           </a:p>
@@ -3467,11 +3555,11 @@
           <a:p>
             <a:r>
               <a:rPr lang="en-US" dirty="0" err="1"/>
-              <a:t>AddressBook</a:t>
+              <a:t>TaskForce</a:t>
             </a:r>
             <a:r>
               <a:rPr lang="en-US" dirty="0"/>
-              <a:t> – Level 4</a:t>
+              <a:t> App</a:t>
             </a:r>
           </a:p>
         </p:txBody>

</xml_diff>

<commit_message>
Updated the developer guide's logic graphic to demostrate the various new commands we made
</commit_message>
<xml_diff>
--- a/docs/diagrams/Diagrams.pptx
+++ b/docs/diagrams/Diagrams.pptx
@@ -216,7 +216,7 @@
           <a:p>
             <a:fld id="{F5CC4B3F-88C1-4FFA-B1B6-F41C21DC6924}" type="datetimeFigureOut">
               <a:rPr lang="en-US" smtClean="0"/>
-              <a:t>10/19/2016</a:t>
+              <a:t>10/28/2016</a:t>
             </a:fld>
             <a:endParaRPr lang="en-US"/>
           </a:p>
@@ -750,7 +750,7 @@
           <a:p>
             <a:fld id="{78C97017-6FC3-485B-9764-EAC9E56C1D49}" type="datetimeFigureOut">
               <a:rPr lang="en-US" smtClean="0"/>
-              <a:t>10/19/2016</a:t>
+              <a:t>10/28/2016</a:t>
             </a:fld>
             <a:endParaRPr lang="en-US"/>
           </a:p>
@@ -918,7 +918,7 @@
           <a:p>
             <a:fld id="{78C97017-6FC3-485B-9764-EAC9E56C1D49}" type="datetimeFigureOut">
               <a:rPr lang="en-US" smtClean="0"/>
-              <a:t>10/19/2016</a:t>
+              <a:t>10/28/2016</a:t>
             </a:fld>
             <a:endParaRPr lang="en-US"/>
           </a:p>
@@ -1096,7 +1096,7 @@
           <a:p>
             <a:fld id="{78C97017-6FC3-485B-9764-EAC9E56C1D49}" type="datetimeFigureOut">
               <a:rPr lang="en-US" smtClean="0"/>
-              <a:t>10/19/2016</a:t>
+              <a:t>10/28/2016</a:t>
             </a:fld>
             <a:endParaRPr lang="en-US"/>
           </a:p>
@@ -1264,7 +1264,7 @@
           <a:p>
             <a:fld id="{78C97017-6FC3-485B-9764-EAC9E56C1D49}" type="datetimeFigureOut">
               <a:rPr lang="en-US" smtClean="0"/>
-              <a:t>10/19/2016</a:t>
+              <a:t>10/28/2016</a:t>
             </a:fld>
             <a:endParaRPr lang="en-US"/>
           </a:p>
@@ -1509,7 +1509,7 @@
           <a:p>
             <a:fld id="{78C97017-6FC3-485B-9764-EAC9E56C1D49}" type="datetimeFigureOut">
               <a:rPr lang="en-US" smtClean="0"/>
-              <a:t>10/19/2016</a:t>
+              <a:t>10/28/2016</a:t>
             </a:fld>
             <a:endParaRPr lang="en-US"/>
           </a:p>
@@ -1794,7 +1794,7 @@
           <a:p>
             <a:fld id="{78C97017-6FC3-485B-9764-EAC9E56C1D49}" type="datetimeFigureOut">
               <a:rPr lang="en-US" smtClean="0"/>
-              <a:t>10/19/2016</a:t>
+              <a:t>10/28/2016</a:t>
             </a:fld>
             <a:endParaRPr lang="en-US"/>
           </a:p>
@@ -2213,7 +2213,7 @@
           <a:p>
             <a:fld id="{78C97017-6FC3-485B-9764-EAC9E56C1D49}" type="datetimeFigureOut">
               <a:rPr lang="en-US" smtClean="0"/>
-              <a:t>10/19/2016</a:t>
+              <a:t>10/28/2016</a:t>
             </a:fld>
             <a:endParaRPr lang="en-US"/>
           </a:p>
@@ -2330,7 +2330,7 @@
           <a:p>
             <a:fld id="{78C97017-6FC3-485B-9764-EAC9E56C1D49}" type="datetimeFigureOut">
               <a:rPr lang="en-US" smtClean="0"/>
-              <a:t>10/19/2016</a:t>
+              <a:t>10/28/2016</a:t>
             </a:fld>
             <a:endParaRPr lang="en-US"/>
           </a:p>
@@ -2425,7 +2425,7 @@
           <a:p>
             <a:fld id="{78C97017-6FC3-485B-9764-EAC9E56C1D49}" type="datetimeFigureOut">
               <a:rPr lang="en-US" smtClean="0"/>
-              <a:t>10/19/2016</a:t>
+              <a:t>10/28/2016</a:t>
             </a:fld>
             <a:endParaRPr lang="en-US"/>
           </a:p>
@@ -2700,7 +2700,7 @@
           <a:p>
             <a:fld id="{78C97017-6FC3-485B-9764-EAC9E56C1D49}" type="datetimeFigureOut">
               <a:rPr lang="en-US" smtClean="0"/>
-              <a:t>10/19/2016</a:t>
+              <a:t>10/28/2016</a:t>
             </a:fld>
             <a:endParaRPr lang="en-US"/>
           </a:p>
@@ -2952,7 +2952,7 @@
           <a:p>
             <a:fld id="{78C97017-6FC3-485B-9764-EAC9E56C1D49}" type="datetimeFigureOut">
               <a:rPr lang="en-US" smtClean="0"/>
-              <a:t>10/19/2016</a:t>
+              <a:t>10/28/2016</a:t>
             </a:fld>
             <a:endParaRPr lang="en-US"/>
           </a:p>
@@ -3163,7 +3163,7 @@
           <a:p>
             <a:fld id="{78C97017-6FC3-485B-9764-EAC9E56C1D49}" type="datetimeFigureOut">
               <a:rPr lang="en-US" smtClean="0"/>
-              <a:t>10/19/2016</a:t>
+              <a:t>10/28/2016</a:t>
             </a:fld>
             <a:endParaRPr lang="en-US"/>
           </a:p>
@@ -9983,7 +9983,7 @@
                   <a:srgbClr val="0070C0"/>
                 </a:solidFill>
               </a:rPr>
-              <a:t>AddCommand</a:t>
+              <a:t>EditCommand</a:t>
             </a:r>
             <a:endParaRPr lang="en-SG" sz="1050" b="1" dirty="0">
               <a:solidFill>
@@ -11455,27 +11455,12 @@
           <a:p>
             <a:pPr algn="ctr"/>
             <a:r>
-              <a:rPr lang="en-US" sz="1050" b="1" dirty="0">
+              <a:rPr lang="en-US" sz="1050" b="1" dirty="0" err="1">
                 <a:solidFill>
                   <a:srgbClr val="0070C0"/>
                 </a:solidFill>
               </a:rPr>
-              <a:t>Incorrect</a:t>
-            </a:r>
-            <a:br>
-              <a:rPr lang="en-US" sz="1050" b="1" dirty="0">
-                <a:solidFill>
-                  <a:srgbClr val="0070C0"/>
-                </a:solidFill>
-              </a:rPr>
-            </a:br>
-            <a:r>
-              <a:rPr lang="en-US" sz="1050" b="1" dirty="0">
-                <a:solidFill>
-                  <a:srgbClr val="0070C0"/>
-                </a:solidFill>
-              </a:rPr>
-              <a:t>Command</a:t>
+              <a:t>AddCommand</a:t>
             </a:r>
             <a:endParaRPr lang="en-SG" sz="1050" b="1" dirty="0">
               <a:solidFill>
@@ -12153,6 +12138,246 @@
           </p:txBody>
         </p:sp>
       </p:grpSp>
+      <p:sp>
+        <p:nvSpPr>
+          <p:cNvPr id="53" name="Rectangle 11"/>
+          <p:cNvSpPr/>
+          <p:nvPr/>
+        </p:nvSpPr>
+        <p:spPr>
+          <a:xfrm flipH="1">
+            <a:off x="6180592" y="2243743"/>
+            <a:ext cx="1093635" cy="346760"/>
+          </a:xfrm>
+          <a:prstGeom prst="rect">
+            <a:avLst/>
+          </a:prstGeom>
+          <a:ln w="19050">
+            <a:solidFill>
+              <a:srgbClr val="0070C0"/>
+            </a:solidFill>
+          </a:ln>
+          <a:effectLst/>
+        </p:spPr>
+        <p:style>
+          <a:lnRef idx="1">
+            <a:schemeClr val="accent1"/>
+          </a:lnRef>
+          <a:fillRef idx="2">
+            <a:schemeClr val="accent1"/>
+          </a:fillRef>
+          <a:effectRef idx="1">
+            <a:schemeClr val="accent1"/>
+          </a:effectRef>
+          <a:fontRef idx="minor">
+            <a:schemeClr val="dk1"/>
+          </a:fontRef>
+        </p:style>
+        <p:txBody>
+          <a:bodyPr rtlCol="0" anchor="ctr"/>
+          <a:lstStyle/>
+          <a:p>
+            <a:pPr algn="ctr"/>
+            <a:r>
+              <a:rPr lang="en-US" sz="1050" b="1" dirty="0" err="1">
+                <a:solidFill>
+                  <a:srgbClr val="0070C0"/>
+                </a:solidFill>
+              </a:rPr>
+              <a:t>UndoCommand</a:t>
+            </a:r>
+            <a:endParaRPr lang="en-SG" sz="1050" b="1" dirty="0">
+              <a:solidFill>
+                <a:srgbClr val="0070C0"/>
+              </a:solidFill>
+            </a:endParaRPr>
+          </a:p>
+        </p:txBody>
+      </p:sp>
+      <p:sp>
+        <p:nvSpPr>
+          <p:cNvPr id="55" name="Rectangle 11"/>
+          <p:cNvSpPr/>
+          <p:nvPr/>
+        </p:nvSpPr>
+        <p:spPr>
+          <a:xfrm flipH="1">
+            <a:off x="6180592" y="1855597"/>
+            <a:ext cx="1093635" cy="346760"/>
+          </a:xfrm>
+          <a:prstGeom prst="rect">
+            <a:avLst/>
+          </a:prstGeom>
+          <a:ln w="19050">
+            <a:solidFill>
+              <a:srgbClr val="0070C0"/>
+            </a:solidFill>
+          </a:ln>
+          <a:effectLst/>
+        </p:spPr>
+        <p:style>
+          <a:lnRef idx="1">
+            <a:schemeClr val="accent1"/>
+          </a:lnRef>
+          <a:fillRef idx="2">
+            <a:schemeClr val="accent1"/>
+          </a:fillRef>
+          <a:effectRef idx="1">
+            <a:schemeClr val="accent1"/>
+          </a:effectRef>
+          <a:fontRef idx="minor">
+            <a:schemeClr val="dk1"/>
+          </a:fontRef>
+        </p:style>
+        <p:txBody>
+          <a:bodyPr rtlCol="0" anchor="ctr"/>
+          <a:lstStyle/>
+          <a:p>
+            <a:pPr algn="ctr"/>
+            <a:r>
+              <a:rPr lang="en-US" sz="1050" b="1" dirty="0" err="1">
+                <a:solidFill>
+                  <a:srgbClr val="0070C0"/>
+                </a:solidFill>
+              </a:rPr>
+              <a:t>Freetime</a:t>
+            </a:r>
+            <a:endParaRPr lang="en-US" sz="1050" b="1" dirty="0">
+              <a:solidFill>
+                <a:srgbClr val="0070C0"/>
+              </a:solidFill>
+            </a:endParaRPr>
+          </a:p>
+          <a:p>
+            <a:pPr algn="ctr"/>
+            <a:r>
+              <a:rPr lang="en-US" sz="1050" b="1" dirty="0">
+                <a:solidFill>
+                  <a:srgbClr val="0070C0"/>
+                </a:solidFill>
+              </a:rPr>
+              <a:t>Command</a:t>
+            </a:r>
+            <a:endParaRPr lang="en-SG" sz="1050" b="1" dirty="0">
+              <a:solidFill>
+                <a:srgbClr val="0070C0"/>
+              </a:solidFill>
+            </a:endParaRPr>
+          </a:p>
+        </p:txBody>
+      </p:sp>
+      <p:sp>
+        <p:nvSpPr>
+          <p:cNvPr id="57" name="Rectangle 11"/>
+          <p:cNvSpPr/>
+          <p:nvPr/>
+        </p:nvSpPr>
+        <p:spPr>
+          <a:xfrm flipH="1">
+            <a:off x="6180592" y="1472600"/>
+            <a:ext cx="1093635" cy="346760"/>
+          </a:xfrm>
+          <a:prstGeom prst="rect">
+            <a:avLst/>
+          </a:prstGeom>
+          <a:ln w="19050">
+            <a:solidFill>
+              <a:srgbClr val="0070C0"/>
+            </a:solidFill>
+          </a:ln>
+          <a:effectLst/>
+        </p:spPr>
+        <p:style>
+          <a:lnRef idx="1">
+            <a:schemeClr val="accent1"/>
+          </a:lnRef>
+          <a:fillRef idx="2">
+            <a:schemeClr val="accent1"/>
+          </a:fillRef>
+          <a:effectRef idx="1">
+            <a:schemeClr val="accent1"/>
+          </a:effectRef>
+          <a:fontRef idx="minor">
+            <a:schemeClr val="dk1"/>
+          </a:fontRef>
+        </p:style>
+        <p:txBody>
+          <a:bodyPr rtlCol="0" anchor="ctr"/>
+          <a:lstStyle/>
+          <a:p>
+            <a:pPr algn="ctr"/>
+            <a:r>
+              <a:rPr lang="en-US" sz="1050" b="1" dirty="0" err="1">
+                <a:solidFill>
+                  <a:srgbClr val="0070C0"/>
+                </a:solidFill>
+              </a:rPr>
+              <a:t>MarkCommand</a:t>
+            </a:r>
+            <a:endParaRPr lang="en-SG" sz="1050" b="1" dirty="0">
+              <a:solidFill>
+                <a:srgbClr val="0070C0"/>
+              </a:solidFill>
+            </a:endParaRPr>
+          </a:p>
+        </p:txBody>
+      </p:sp>
+      <p:sp>
+        <p:nvSpPr>
+          <p:cNvPr id="58" name="Rectangle 11"/>
+          <p:cNvSpPr/>
+          <p:nvPr/>
+        </p:nvSpPr>
+        <p:spPr>
+          <a:xfrm flipH="1">
+            <a:off x="6180592" y="1076328"/>
+            <a:ext cx="1093635" cy="346760"/>
+          </a:xfrm>
+          <a:prstGeom prst="rect">
+            <a:avLst/>
+          </a:prstGeom>
+          <a:ln w="19050">
+            <a:solidFill>
+              <a:srgbClr val="0070C0"/>
+            </a:solidFill>
+          </a:ln>
+          <a:effectLst/>
+        </p:spPr>
+        <p:style>
+          <a:lnRef idx="1">
+            <a:schemeClr val="accent1"/>
+          </a:lnRef>
+          <a:fillRef idx="2">
+            <a:schemeClr val="accent1"/>
+          </a:fillRef>
+          <a:effectRef idx="1">
+            <a:schemeClr val="accent1"/>
+          </a:effectRef>
+          <a:fontRef idx="minor">
+            <a:schemeClr val="dk1"/>
+          </a:fontRef>
+        </p:style>
+        <p:txBody>
+          <a:bodyPr rtlCol="0" anchor="ctr"/>
+          <a:lstStyle/>
+          <a:p>
+            <a:pPr algn="ctr"/>
+            <a:r>
+              <a:rPr lang="en-US" sz="1050" b="1" dirty="0" err="1">
+                <a:solidFill>
+                  <a:srgbClr val="0070C0"/>
+                </a:solidFill>
+              </a:rPr>
+              <a:t>BlockCommand</a:t>
+            </a:r>
+            <a:endParaRPr lang="en-SG" sz="1050" b="1" dirty="0">
+              <a:solidFill>
+                <a:srgbClr val="0070C0"/>
+              </a:solidFill>
+            </a:endParaRPr>
+          </a:p>
+        </p:txBody>
+      </p:sp>
     </p:spTree>
     <p:extLst>
       <p:ext uri="{BB962C8B-B14F-4D97-AF65-F5344CB8AC3E}">

</xml_diff>

<commit_message>
Update model's image in dev guide
</commit_message>
<xml_diff>
--- a/docs/diagrams/Diagrams.pptx
+++ b/docs/diagrams/Diagrams.pptx
@@ -119,7 +119,7 @@
   </p:defaultTextStyle>
   <p:extLst>
     <p:ext uri="{EFAFB233-063F-42B5-8137-9DF3F51BA10A}">
-      <p15:sldGuideLst xmlns="" xmlns:p15="http://schemas.microsoft.com/office/powerpoint/2012/main">
+      <p15:sldGuideLst xmlns:p15="http://schemas.microsoft.com/office/powerpoint/2012/main">
         <p15:guide id="1" orient="horz" pos="1488">
           <p15:clr>
             <a:srgbClr val="A4A3A4"/>
@@ -219,7 +219,7 @@
             <a:fld id="{F5CC4B3F-88C1-4FFA-B1B6-F41C21DC6924}" type="datetimeFigureOut">
               <a:rPr lang="en-US" smtClean="0"/>
               <a:pPr/>
-              <a:t>11/4/2016</a:t>
+              <a:t>11/5/2016</a:t>
             </a:fld>
             <a:endParaRPr lang="en-US"/>
           </a:p>
@@ -387,7 +387,7 @@
     </p:spTree>
     <p:extLst>
       <p:ext uri="{BB962C8B-B14F-4D97-AF65-F5344CB8AC3E}">
-        <p14:creationId xmlns="" xmlns:p14="http://schemas.microsoft.com/office/powerpoint/2010/main" val="2023976206"/>
+        <p14:creationId xmlns:p14="http://schemas.microsoft.com/office/powerpoint/2010/main" val="2023976206"/>
       </p:ext>
     </p:extLst>
   </p:cSld>
@@ -566,7 +566,7 @@
     </p:spTree>
     <p:extLst>
       <p:ext uri="{BB962C8B-B14F-4D97-AF65-F5344CB8AC3E}">
-        <p14:creationId xmlns="" xmlns:p14="http://schemas.microsoft.com/office/powerpoint/2010/main" val="1791593621"/>
+        <p14:creationId xmlns:p14="http://schemas.microsoft.com/office/powerpoint/2010/main" val="1791593621"/>
       </p:ext>
     </p:extLst>
   </p:cSld>
@@ -756,7 +756,7 @@
             <a:fld id="{78C97017-6FC3-485B-9764-EAC9E56C1D49}" type="datetimeFigureOut">
               <a:rPr lang="en-US" smtClean="0"/>
               <a:pPr/>
-              <a:t>11/4/2016</a:t>
+              <a:t>11/5/2016</a:t>
             </a:fld>
             <a:endParaRPr lang="en-US"/>
           </a:p>
@@ -808,7 +808,7 @@
     </p:spTree>
     <p:extLst>
       <p:ext uri="{BB962C8B-B14F-4D97-AF65-F5344CB8AC3E}">
-        <p14:creationId xmlns="" xmlns:p14="http://schemas.microsoft.com/office/powerpoint/2010/main" val="3246593157"/>
+        <p14:creationId xmlns:p14="http://schemas.microsoft.com/office/powerpoint/2010/main" val="3246593157"/>
       </p:ext>
     </p:extLst>
   </p:cSld>
@@ -926,7 +926,7 @@
             <a:fld id="{78C97017-6FC3-485B-9764-EAC9E56C1D49}" type="datetimeFigureOut">
               <a:rPr lang="en-US" smtClean="0"/>
               <a:pPr/>
-              <a:t>11/4/2016</a:t>
+              <a:t>11/5/2016</a:t>
             </a:fld>
             <a:endParaRPr lang="en-US"/>
           </a:p>
@@ -978,7 +978,7 @@
     </p:spTree>
     <p:extLst>
       <p:ext uri="{BB962C8B-B14F-4D97-AF65-F5344CB8AC3E}">
-        <p14:creationId xmlns="" xmlns:p14="http://schemas.microsoft.com/office/powerpoint/2010/main" val="2707025021"/>
+        <p14:creationId xmlns:p14="http://schemas.microsoft.com/office/powerpoint/2010/main" val="2707025021"/>
       </p:ext>
     </p:extLst>
   </p:cSld>
@@ -1106,7 +1106,7 @@
             <a:fld id="{78C97017-6FC3-485B-9764-EAC9E56C1D49}" type="datetimeFigureOut">
               <a:rPr lang="en-US" smtClean="0"/>
               <a:pPr/>
-              <a:t>11/4/2016</a:t>
+              <a:t>11/5/2016</a:t>
             </a:fld>
             <a:endParaRPr lang="en-US"/>
           </a:p>
@@ -1158,7 +1158,7 @@
     </p:spTree>
     <p:extLst>
       <p:ext uri="{BB962C8B-B14F-4D97-AF65-F5344CB8AC3E}">
-        <p14:creationId xmlns="" xmlns:p14="http://schemas.microsoft.com/office/powerpoint/2010/main" val="568378986"/>
+        <p14:creationId xmlns:p14="http://schemas.microsoft.com/office/powerpoint/2010/main" val="568378986"/>
       </p:ext>
     </p:extLst>
   </p:cSld>
@@ -1276,7 +1276,7 @@
             <a:fld id="{78C97017-6FC3-485B-9764-EAC9E56C1D49}" type="datetimeFigureOut">
               <a:rPr lang="en-US" smtClean="0"/>
               <a:pPr/>
-              <a:t>11/4/2016</a:t>
+              <a:t>11/5/2016</a:t>
             </a:fld>
             <a:endParaRPr lang="en-US"/>
           </a:p>
@@ -1328,7 +1328,7 @@
     </p:spTree>
     <p:extLst>
       <p:ext uri="{BB962C8B-B14F-4D97-AF65-F5344CB8AC3E}">
-        <p14:creationId xmlns="" xmlns:p14="http://schemas.microsoft.com/office/powerpoint/2010/main" val="266658052"/>
+        <p14:creationId xmlns:p14="http://schemas.microsoft.com/office/powerpoint/2010/main" val="266658052"/>
       </p:ext>
     </p:extLst>
   </p:cSld>
@@ -1523,7 +1523,7 @@
             <a:fld id="{78C97017-6FC3-485B-9764-EAC9E56C1D49}" type="datetimeFigureOut">
               <a:rPr lang="en-US" smtClean="0"/>
               <a:pPr/>
-              <a:t>11/4/2016</a:t>
+              <a:t>11/5/2016</a:t>
             </a:fld>
             <a:endParaRPr lang="en-US"/>
           </a:p>
@@ -1575,7 +1575,7 @@
     </p:spTree>
     <p:extLst>
       <p:ext uri="{BB962C8B-B14F-4D97-AF65-F5344CB8AC3E}">
-        <p14:creationId xmlns="" xmlns:p14="http://schemas.microsoft.com/office/powerpoint/2010/main" val="474686344"/>
+        <p14:creationId xmlns:p14="http://schemas.microsoft.com/office/powerpoint/2010/main" val="474686344"/>
       </p:ext>
     </p:extLst>
   </p:cSld>
@@ -1810,7 +1810,7 @@
             <a:fld id="{78C97017-6FC3-485B-9764-EAC9E56C1D49}" type="datetimeFigureOut">
               <a:rPr lang="en-US" smtClean="0"/>
               <a:pPr/>
-              <a:t>11/4/2016</a:t>
+              <a:t>11/5/2016</a:t>
             </a:fld>
             <a:endParaRPr lang="en-US"/>
           </a:p>
@@ -1862,7 +1862,7 @@
     </p:spTree>
     <p:extLst>
       <p:ext uri="{BB962C8B-B14F-4D97-AF65-F5344CB8AC3E}">
-        <p14:creationId xmlns="" xmlns:p14="http://schemas.microsoft.com/office/powerpoint/2010/main" val="562293251"/>
+        <p14:creationId xmlns:p14="http://schemas.microsoft.com/office/powerpoint/2010/main" val="562293251"/>
       </p:ext>
     </p:extLst>
   </p:cSld>
@@ -2231,7 +2231,7 @@
             <a:fld id="{78C97017-6FC3-485B-9764-EAC9E56C1D49}" type="datetimeFigureOut">
               <a:rPr lang="en-US" smtClean="0"/>
               <a:pPr/>
-              <a:t>11/4/2016</a:t>
+              <a:t>11/5/2016</a:t>
             </a:fld>
             <a:endParaRPr lang="en-US"/>
           </a:p>
@@ -2283,7 +2283,7 @@
     </p:spTree>
     <p:extLst>
       <p:ext uri="{BB962C8B-B14F-4D97-AF65-F5344CB8AC3E}">
-        <p14:creationId xmlns="" xmlns:p14="http://schemas.microsoft.com/office/powerpoint/2010/main" val="1126424250"/>
+        <p14:creationId xmlns:p14="http://schemas.microsoft.com/office/powerpoint/2010/main" val="1126424250"/>
       </p:ext>
     </p:extLst>
   </p:cSld>
@@ -2350,7 +2350,7 @@
             <a:fld id="{78C97017-6FC3-485B-9764-EAC9E56C1D49}" type="datetimeFigureOut">
               <a:rPr lang="en-US" smtClean="0"/>
               <a:pPr/>
-              <a:t>11/4/2016</a:t>
+              <a:t>11/5/2016</a:t>
             </a:fld>
             <a:endParaRPr lang="en-US"/>
           </a:p>
@@ -2402,7 +2402,7 @@
     </p:spTree>
     <p:extLst>
       <p:ext uri="{BB962C8B-B14F-4D97-AF65-F5344CB8AC3E}">
-        <p14:creationId xmlns="" xmlns:p14="http://schemas.microsoft.com/office/powerpoint/2010/main" val="4159724230"/>
+        <p14:creationId xmlns:p14="http://schemas.microsoft.com/office/powerpoint/2010/main" val="4159724230"/>
       </p:ext>
     </p:extLst>
   </p:cSld>
@@ -2447,7 +2447,7 @@
             <a:fld id="{78C97017-6FC3-485B-9764-EAC9E56C1D49}" type="datetimeFigureOut">
               <a:rPr lang="en-US" smtClean="0"/>
               <a:pPr/>
-              <a:t>11/4/2016</a:t>
+              <a:t>11/5/2016</a:t>
             </a:fld>
             <a:endParaRPr lang="en-US"/>
           </a:p>
@@ -2499,7 +2499,7 @@
     </p:spTree>
     <p:extLst>
       <p:ext uri="{BB962C8B-B14F-4D97-AF65-F5344CB8AC3E}">
-        <p14:creationId xmlns="" xmlns:p14="http://schemas.microsoft.com/office/powerpoint/2010/main" val="1793928710"/>
+        <p14:creationId xmlns:p14="http://schemas.microsoft.com/office/powerpoint/2010/main" val="1793928710"/>
       </p:ext>
     </p:extLst>
   </p:cSld>
@@ -2724,7 +2724,7 @@
             <a:fld id="{78C97017-6FC3-485B-9764-EAC9E56C1D49}" type="datetimeFigureOut">
               <a:rPr lang="en-US" smtClean="0"/>
               <a:pPr/>
-              <a:t>11/4/2016</a:t>
+              <a:t>11/5/2016</a:t>
             </a:fld>
             <a:endParaRPr lang="en-US"/>
           </a:p>
@@ -2776,7 +2776,7 @@
     </p:spTree>
     <p:extLst>
       <p:ext uri="{BB962C8B-B14F-4D97-AF65-F5344CB8AC3E}">
-        <p14:creationId xmlns="" xmlns:p14="http://schemas.microsoft.com/office/powerpoint/2010/main" val="2076802089"/>
+        <p14:creationId xmlns:p14="http://schemas.microsoft.com/office/powerpoint/2010/main" val="2076802089"/>
       </p:ext>
     </p:extLst>
   </p:cSld>
@@ -2978,7 +2978,7 @@
             <a:fld id="{78C97017-6FC3-485B-9764-EAC9E56C1D49}" type="datetimeFigureOut">
               <a:rPr lang="en-US" smtClean="0"/>
               <a:pPr/>
-              <a:t>11/4/2016</a:t>
+              <a:t>11/5/2016</a:t>
             </a:fld>
             <a:endParaRPr lang="en-US"/>
           </a:p>
@@ -3030,7 +3030,7 @@
     </p:spTree>
     <p:extLst>
       <p:ext uri="{BB962C8B-B14F-4D97-AF65-F5344CB8AC3E}">
-        <p14:creationId xmlns="" xmlns:p14="http://schemas.microsoft.com/office/powerpoint/2010/main" val="201835938"/>
+        <p14:creationId xmlns:p14="http://schemas.microsoft.com/office/powerpoint/2010/main" val="201835938"/>
       </p:ext>
     </p:extLst>
   </p:cSld>
@@ -3191,7 +3191,7 @@
             <a:fld id="{78C97017-6FC3-485B-9764-EAC9E56C1D49}" type="datetimeFigureOut">
               <a:rPr lang="en-US" smtClean="0"/>
               <a:pPr/>
-              <a:t>11/4/2016</a:t>
+              <a:t>11/5/2016</a:t>
             </a:fld>
             <a:endParaRPr lang="en-US"/>
           </a:p>
@@ -3279,7 +3279,7 @@
     </p:spTree>
     <p:extLst>
       <p:ext uri="{BB962C8B-B14F-4D97-AF65-F5344CB8AC3E}">
-        <p14:creationId xmlns="" xmlns:p14="http://schemas.microsoft.com/office/powerpoint/2010/main" val="2341400630"/>
+        <p14:creationId xmlns:p14="http://schemas.microsoft.com/office/powerpoint/2010/main" val="2341400630"/>
       </p:ext>
     </p:extLst>
   </p:cSld>
@@ -3618,7 +3618,7 @@
     </p:spTree>
     <p:extLst>
       <p:ext uri="{BB962C8B-B14F-4D97-AF65-F5344CB8AC3E}">
-        <p14:creationId xmlns="" xmlns:p14="http://schemas.microsoft.com/office/powerpoint/2010/main" val="2960930635"/>
+        <p14:creationId xmlns:p14="http://schemas.microsoft.com/office/powerpoint/2010/main" val="2960930635"/>
       </p:ext>
     </p:extLst>
   </p:cSld>
@@ -5040,13 +5040,20 @@
     </p:spTree>
     <p:extLst>
       <p:ext uri="{BB962C8B-B14F-4D97-AF65-F5344CB8AC3E}">
-        <p14:creationId xmlns="" xmlns:p14="http://schemas.microsoft.com/office/powerpoint/2010/main" val="1478832369"/>
+        <p14:creationId xmlns:p14="http://schemas.microsoft.com/office/powerpoint/2010/main" val="1478832369"/>
       </p:ext>
     </p:extLst>
   </p:cSld>
   <p:clrMapOvr>
     <a:masterClrMapping/>
   </p:clrMapOvr>
+  <p:timing>
+    <p:tnLst>
+      <p:par>
+        <p:cTn id="1" dur="indefinite" restart="never" nodeType="tmRoot"/>
+      </p:par>
+    </p:tnLst>
+  </p:timing>
 </p:sld>
 </file>
 
@@ -6720,7 +6727,7 @@
     </p:spTree>
     <p:extLst>
       <p:ext uri="{BB962C8B-B14F-4D97-AF65-F5344CB8AC3E}">
-        <p14:creationId xmlns="" xmlns:p14="http://schemas.microsoft.com/office/powerpoint/2010/main" val="1981432603"/>
+        <p14:creationId xmlns:p14="http://schemas.microsoft.com/office/powerpoint/2010/main" val="1981432603"/>
       </p:ext>
     </p:extLst>
   </p:cSld>
@@ -9343,7 +9350,7 @@
     </p:spTree>
     <p:extLst>
       <p:ext uri="{BB962C8B-B14F-4D97-AF65-F5344CB8AC3E}">
-        <p14:creationId xmlns="" xmlns:p14="http://schemas.microsoft.com/office/powerpoint/2010/main" val="1434580780"/>
+        <p14:creationId xmlns:p14="http://schemas.microsoft.com/office/powerpoint/2010/main" val="1434580780"/>
       </p:ext>
     </p:extLst>
   </p:cSld>
@@ -11530,7 +11537,7 @@
     </p:spTree>
     <p:extLst>
       <p:ext uri="{BB962C8B-B14F-4D97-AF65-F5344CB8AC3E}">
-        <p14:creationId xmlns="" xmlns:p14="http://schemas.microsoft.com/office/powerpoint/2010/main" val="4023378879"/>
+        <p14:creationId xmlns:p14="http://schemas.microsoft.com/office/powerpoint/2010/main" val="4023378879"/>
       </p:ext>
     </p:extLst>
   </p:cSld>
@@ -13326,7 +13333,7 @@
     </p:spTree>
     <p:extLst>
       <p:ext uri="{BB962C8B-B14F-4D97-AF65-F5344CB8AC3E}">
-        <p14:creationId xmlns="" xmlns:p14="http://schemas.microsoft.com/office/powerpoint/2010/main" val="363914971"/>
+        <p14:creationId xmlns:p14="http://schemas.microsoft.com/office/powerpoint/2010/main" val="363914971"/>
       </p:ext>
     </p:extLst>
   </p:cSld>
@@ -15568,7 +15575,7 @@
     </p:spTree>
     <p:extLst>
       <p:ext uri="{BB962C8B-B14F-4D97-AF65-F5344CB8AC3E}">
-        <p14:creationId xmlns="" xmlns:p14="http://schemas.microsoft.com/office/powerpoint/2010/main" val="2776882492"/>
+        <p14:creationId xmlns:p14="http://schemas.microsoft.com/office/powerpoint/2010/main" val="2776882492"/>
       </p:ext>
     </p:extLst>
   </p:cSld>
@@ -18182,7 +18189,7 @@
     </p:spTree>
     <p:extLst>
       <p:ext uri="{BB962C8B-B14F-4D97-AF65-F5344CB8AC3E}">
-        <p14:creationId xmlns="" xmlns:p14="http://schemas.microsoft.com/office/powerpoint/2010/main" val="599777654"/>
+        <p14:creationId xmlns:p14="http://schemas.microsoft.com/office/powerpoint/2010/main" val="599777654"/>
       </p:ext>
     </p:extLst>
   </p:cSld>
@@ -20079,7 +20086,7 @@
     </p:spTree>
     <p:extLst>
       <p:ext uri="{BB962C8B-B14F-4D97-AF65-F5344CB8AC3E}">
-        <p14:creationId xmlns="" xmlns:p14="http://schemas.microsoft.com/office/powerpoint/2010/main" val="3945898909"/>
+        <p14:creationId xmlns:p14="http://schemas.microsoft.com/office/powerpoint/2010/main" val="3945898909"/>
       </p:ext>
     </p:extLst>
   </p:cSld>
@@ -20121,7 +20128,7 @@
         </p:nvSpPr>
         <p:spPr>
           <a:xfrm>
-            <a:off x="838200" y="1295400"/>
+            <a:off x="228600" y="1295400"/>
             <a:ext cx="8686800" cy="4800600"/>
           </a:xfrm>
           <a:prstGeom prst="roundRect">
@@ -20182,7 +20189,7 @@
         </p:nvSpPr>
         <p:spPr>
           <a:xfrm>
-            <a:off x="2877180" y="3158440"/>
+            <a:off x="2267580" y="3158440"/>
             <a:ext cx="1093635" cy="346760"/>
           </a:xfrm>
           <a:prstGeom prst="rect">
@@ -20241,7 +20248,7 @@
         </p:nvSpPr>
         <p:spPr>
           <a:xfrm rot="16200000">
-            <a:off x="1683963" y="2868687"/>
+            <a:off x="1074363" y="2868687"/>
             <a:ext cx="1093635" cy="346760"/>
           </a:xfrm>
           <a:prstGeom prst="rect">
@@ -20302,7 +20309,7 @@
         </p:nvCxnSpPr>
         <p:spPr>
           <a:xfrm flipV="1">
-            <a:off x="5908596" y="3858658"/>
+            <a:off x="5298996" y="3858658"/>
             <a:ext cx="577381" cy="445174"/>
           </a:xfrm>
           <a:prstGeom prst="bentConnector3">
@@ -20346,7 +20353,7 @@
         </p:nvCxnSpPr>
         <p:spPr>
           <a:xfrm rot="16200000" flipH="1">
-            <a:off x="4315528" y="1504137"/>
+            <a:off x="3705928" y="1504137"/>
             <a:ext cx="267495" cy="4436989"/>
           </a:xfrm>
           <a:prstGeom prst="bentConnector3">
@@ -20387,7 +20394,7 @@
         </p:nvSpPr>
         <p:spPr>
           <a:xfrm rot="16200000">
-            <a:off x="956202" y="2861202"/>
+            <a:off x="346602" y="2861202"/>
             <a:ext cx="1093635" cy="346760"/>
           </a:xfrm>
           <a:prstGeom prst="rect">
@@ -20457,7 +20464,7 @@
         </p:nvSpPr>
         <p:spPr>
           <a:xfrm rot="16200000">
-            <a:off x="1626910" y="2952291"/>
+            <a:off x="1017310" y="2952291"/>
             <a:ext cx="270504" cy="175523"/>
           </a:xfrm>
           <a:prstGeom prst="triangle">
@@ -20507,7 +20514,7 @@
         </p:nvCxnSpPr>
         <p:spPr>
           <a:xfrm>
-            <a:off x="2656370" y="3326536"/>
+            <a:off x="2046770" y="3326536"/>
             <a:ext cx="220810" cy="5284"/>
           </a:xfrm>
           <a:prstGeom prst="straightConnector1">
@@ -20545,7 +20552,7 @@
         </p:nvSpPr>
         <p:spPr>
           <a:xfrm rot="5400000" flipV="1">
-            <a:off x="5685582" y="4216070"/>
+            <a:off x="5075982" y="4216070"/>
             <a:ext cx="270504" cy="175523"/>
           </a:xfrm>
           <a:prstGeom prst="triangle">
@@ -20596,7 +20603,7 @@
         </p:nvCxnSpPr>
         <p:spPr>
           <a:xfrm>
-            <a:off x="910091" y="3040053"/>
+            <a:off x="300491" y="3040053"/>
             <a:ext cx="419548" cy="2860"/>
           </a:xfrm>
           <a:prstGeom prst="bentConnector3">
@@ -20641,7 +20648,7 @@
         </p:nvCxnSpPr>
         <p:spPr>
           <a:xfrm flipV="1">
-            <a:off x="1849924" y="3040052"/>
+            <a:off x="1240324" y="3040052"/>
             <a:ext cx="216105" cy="1"/>
           </a:xfrm>
           <a:prstGeom prst="line">
@@ -20680,7 +20687,7 @@
         </p:nvSpPr>
         <p:spPr>
           <a:xfrm>
-            <a:off x="2420322" y="3239846"/>
+            <a:off x="1810722" y="3239846"/>
             <a:ext cx="236048" cy="173380"/>
           </a:xfrm>
           <a:prstGeom prst="flowChartDecision">
@@ -20725,7 +20732,7 @@
         </p:nvSpPr>
         <p:spPr>
           <a:xfrm>
-            <a:off x="2879490" y="2627420"/>
+            <a:off x="2269890" y="2627420"/>
             <a:ext cx="1093635" cy="346760"/>
           </a:xfrm>
           <a:prstGeom prst="rect">
@@ -20784,7 +20791,7 @@
         </p:nvCxnSpPr>
         <p:spPr>
           <a:xfrm>
-            <a:off x="2658680" y="2795516"/>
+            <a:off x="2049080" y="2795516"/>
             <a:ext cx="220810" cy="5284"/>
           </a:xfrm>
           <a:prstGeom prst="straightConnector1">
@@ -20822,7 +20829,7 @@
         </p:nvSpPr>
         <p:spPr>
           <a:xfrm>
-            <a:off x="2422632" y="2708826"/>
+            <a:off x="1813032" y="2708826"/>
             <a:ext cx="236048" cy="173380"/>
           </a:xfrm>
           <a:prstGeom prst="flowChartDecision">
@@ -20867,7 +20874,7 @@
         </p:nvSpPr>
         <p:spPr>
           <a:xfrm>
-            <a:off x="4487017" y="2847371"/>
+            <a:off x="3877417" y="2847371"/>
             <a:ext cx="1156969" cy="346760"/>
           </a:xfrm>
           <a:prstGeom prst="rect">
@@ -20923,7 +20930,7 @@
         </p:nvSpPr>
         <p:spPr>
           <a:xfrm>
-            <a:off x="3984303" y="2673991"/>
+            <a:off x="3374703" y="2673991"/>
             <a:ext cx="236048" cy="173380"/>
           </a:xfrm>
           <a:prstGeom prst="flowChartDecision">
@@ -20973,7 +20980,7 @@
         </p:nvCxnSpPr>
         <p:spPr>
           <a:xfrm>
-            <a:off x="4220351" y="2760681"/>
+            <a:off x="3610751" y="2760681"/>
             <a:ext cx="266666" cy="260070"/>
           </a:xfrm>
           <a:prstGeom prst="bentConnector3">
@@ -21011,7 +21018,7 @@
         </p:nvSpPr>
         <p:spPr>
           <a:xfrm>
-            <a:off x="4503204" y="2280569"/>
+            <a:off x="3893604" y="2280569"/>
             <a:ext cx="1156969" cy="346760"/>
           </a:xfrm>
           <a:prstGeom prst="rect">
@@ -21070,7 +21077,7 @@
         </p:nvCxnSpPr>
         <p:spPr>
           <a:xfrm flipV="1">
-            <a:off x="4220351" y="2453949"/>
+            <a:off x="3610751" y="2453949"/>
             <a:ext cx="282853" cy="306732"/>
           </a:xfrm>
           <a:prstGeom prst="bentConnector3">
@@ -21110,7 +21117,7 @@
         </p:nvSpPr>
         <p:spPr>
           <a:xfrm>
-            <a:off x="6313677" y="3509620"/>
+            <a:off x="5704077" y="3509620"/>
             <a:ext cx="708186" cy="346760"/>
           </a:xfrm>
           <a:prstGeom prst="rect">
@@ -21166,7 +21173,7 @@
         </p:nvSpPr>
         <p:spPr>
           <a:xfrm>
-            <a:off x="5643227" y="2943979"/>
+            <a:off x="5033627" y="2943979"/>
             <a:ext cx="236048" cy="173380"/>
           </a:xfrm>
           <a:prstGeom prst="flowChartDecision">
@@ -21214,7 +21221,7 @@
         </p:nvCxnSpPr>
         <p:spPr>
           <a:xfrm>
-            <a:off x="5879275" y="3030669"/>
+            <a:off x="5269675" y="3030669"/>
             <a:ext cx="434402" cy="652331"/>
           </a:xfrm>
           <a:prstGeom prst="bentConnector3">
@@ -21252,7 +21259,7 @@
         </p:nvSpPr>
         <p:spPr>
           <a:xfrm>
-            <a:off x="6248400" y="2362200"/>
+            <a:off x="5638800" y="2362200"/>
             <a:ext cx="838200" cy="381000"/>
           </a:xfrm>
           <a:prstGeom prst="rect">
@@ -21308,7 +21315,7 @@
         </p:nvSpPr>
         <p:spPr>
           <a:xfrm>
-            <a:off x="5638800" y="2362200"/>
+            <a:off x="5029200" y="2362200"/>
             <a:ext cx="304800" cy="228600"/>
           </a:xfrm>
           <a:prstGeom prst="flowChartDecision">
@@ -21356,7 +21363,7 @@
         </p:nvCxnSpPr>
         <p:spPr>
           <a:xfrm>
-            <a:off x="5943600" y="2476500"/>
+            <a:off x="5334000" y="2476500"/>
             <a:ext cx="304800" cy="76200"/>
           </a:xfrm>
           <a:prstGeom prst="bentConnector3">
@@ -21396,7 +21403,7 @@
         </p:nvSpPr>
         <p:spPr>
           <a:xfrm>
-            <a:off x="4532298" y="4130450"/>
+            <a:off x="3922698" y="4130450"/>
             <a:ext cx="1156969" cy="346760"/>
           </a:xfrm>
           <a:prstGeom prst="rect">
@@ -21467,7 +21474,7 @@
         </p:nvSpPr>
         <p:spPr>
           <a:xfrm>
-            <a:off x="8534400" y="4800600"/>
+            <a:off x="7924800" y="4800600"/>
             <a:ext cx="822003" cy="285783"/>
           </a:xfrm>
           <a:prstGeom prst="rect">
@@ -21523,7 +21530,7 @@
         </p:nvSpPr>
         <p:spPr>
           <a:xfrm>
-            <a:off x="7039009" y="3598806"/>
+            <a:off x="6429409" y="3598806"/>
             <a:ext cx="236048" cy="173380"/>
           </a:xfrm>
           <a:prstGeom prst="flowChartDecision">
@@ -21570,7 +21577,7 @@
         </p:nvSpPr>
         <p:spPr>
           <a:xfrm>
-            <a:off x="8534400" y="4343400"/>
+            <a:off x="7924800" y="4343400"/>
             <a:ext cx="822003" cy="285783"/>
           </a:xfrm>
           <a:prstGeom prst="rect">
@@ -21629,7 +21636,7 @@
         </p:nvCxnSpPr>
         <p:spPr>
           <a:xfrm>
-            <a:off x="7275057" y="3685496"/>
+            <a:off x="6665457" y="3685496"/>
             <a:ext cx="1259343" cy="343596"/>
           </a:xfrm>
           <a:prstGeom prst="bentConnector3">
@@ -21669,7 +21676,7 @@
         </p:nvSpPr>
         <p:spPr>
           <a:xfrm>
-            <a:off x="8534400" y="3200400"/>
+            <a:off x="7924800" y="3200400"/>
             <a:ext cx="822003" cy="285783"/>
           </a:xfrm>
           <a:prstGeom prst="rect">
@@ -21728,7 +21735,7 @@
         </p:nvCxnSpPr>
         <p:spPr>
           <a:xfrm flipV="1">
-            <a:off x="7275057" y="3343292"/>
+            <a:off x="6665457" y="3343292"/>
             <a:ext cx="1259343" cy="342204"/>
           </a:xfrm>
           <a:prstGeom prst="bentConnector3">
@@ -21768,7 +21775,7 @@
         </p:nvSpPr>
         <p:spPr>
           <a:xfrm>
-            <a:off x="8534400" y="3581400"/>
+            <a:off x="7924800" y="3581400"/>
             <a:ext cx="822003" cy="285783"/>
           </a:xfrm>
           <a:prstGeom prst="rect">
@@ -21827,7 +21834,7 @@
         </p:nvCxnSpPr>
         <p:spPr>
           <a:xfrm>
-            <a:off x="7275057" y="3685496"/>
+            <a:off x="6665457" y="3685496"/>
             <a:ext cx="1259343" cy="38796"/>
           </a:xfrm>
           <a:prstGeom prst="bentConnector3">
@@ -21869,7 +21876,7 @@
         </p:nvCxnSpPr>
         <p:spPr>
           <a:xfrm rot="16200000" flipH="1">
-            <a:off x="3279321" y="2485431"/>
+            <a:off x="2669721" y="2485431"/>
             <a:ext cx="293825" cy="1"/>
           </a:xfrm>
           <a:prstGeom prst="bentConnector3">
@@ -21910,7 +21917,7 @@
         </p:nvSpPr>
         <p:spPr>
           <a:xfrm rot="10800000" flipV="1">
-            <a:off x="3290981" y="2162997"/>
+            <a:off x="2681381" y="2162997"/>
             <a:ext cx="270504" cy="175523"/>
           </a:xfrm>
           <a:prstGeom prst="triangle">
@@ -21958,7 +21965,7 @@
         </p:nvSpPr>
         <p:spPr>
           <a:xfrm>
-            <a:off x="2660303" y="1806470"/>
+            <a:off x="2050703" y="1806470"/>
             <a:ext cx="1539926" cy="346760"/>
           </a:xfrm>
           <a:prstGeom prst="rect">
@@ -22029,7 +22036,7 @@
         </p:nvSpPr>
         <p:spPr>
           <a:xfrm>
-            <a:off x="5029200" y="4648200"/>
+            <a:off x="4419600" y="4648200"/>
             <a:ext cx="914400" cy="430887"/>
           </a:xfrm>
           <a:prstGeom prst="rect">
@@ -22076,7 +22083,7 @@
         </p:nvSpPr>
         <p:spPr>
           <a:xfrm>
-            <a:off x="2057400" y="4988194"/>
+            <a:off x="1447800" y="4988194"/>
             <a:ext cx="1775949" cy="346760"/>
           </a:xfrm>
           <a:prstGeom prst="rect">
@@ -22150,7 +22157,7 @@
         </p:nvCxnSpPr>
         <p:spPr>
           <a:xfrm rot="16200000" flipH="1">
-            <a:off x="990123" y="4094297"/>
+            <a:off x="380523" y="4094297"/>
             <a:ext cx="1580174" cy="554380"/>
           </a:xfrm>
           <a:prstGeom prst="bentConnector2">
@@ -22189,7 +22196,7 @@
         </p:nvSpPr>
         <p:spPr>
           <a:xfrm>
-            <a:off x="8534400" y="3886200"/>
+            <a:off x="7924800" y="3886200"/>
             <a:ext cx="822003" cy="285783"/>
           </a:xfrm>
           <a:prstGeom prst="rect">
@@ -22245,7 +22252,7 @@
         </p:nvSpPr>
         <p:spPr>
           <a:xfrm>
-            <a:off x="7010400" y="4800600"/>
+            <a:off x="6400800" y="4800600"/>
             <a:ext cx="708186" cy="346760"/>
           </a:xfrm>
           <a:prstGeom prst="rect">
@@ -22296,7 +22303,7 @@
         </p:nvSpPr>
         <p:spPr>
           <a:xfrm>
-            <a:off x="7010400" y="4343400"/>
+            <a:off x="6400800" y="4343400"/>
             <a:ext cx="708186" cy="346760"/>
           </a:xfrm>
           <a:prstGeom prst="rect">
@@ -22352,7 +22359,7 @@
         </p:nvSpPr>
         <p:spPr>
           <a:xfrm>
-            <a:off x="7010400" y="5562600"/>
+            <a:off x="6400800" y="5562600"/>
             <a:ext cx="708186" cy="346760"/>
           </a:xfrm>
           <a:prstGeom prst="rect">
@@ -22411,7 +22418,7 @@
         </p:nvCxnSpPr>
         <p:spPr>
           <a:xfrm flipV="1">
-            <a:off x="7364493" y="5147360"/>
+            <a:off x="6754893" y="5147360"/>
             <a:ext cx="0" cy="415240"/>
           </a:xfrm>
           <a:prstGeom prst="straightConnector1">
@@ -22453,7 +22460,7 @@
         </p:nvCxnSpPr>
         <p:spPr>
           <a:xfrm flipH="1" flipV="1">
-            <a:off x="6667500" y="2743200"/>
+            <a:off x="6057900" y="2743200"/>
             <a:ext cx="270" cy="766420"/>
           </a:xfrm>
           <a:prstGeom prst="straightConnector1">
@@ -22494,7 +22501,7 @@
         </p:nvCxnSpPr>
         <p:spPr>
           <a:xfrm rot="10800000">
-            <a:off x="6781800" y="3886200"/>
+            <a:off x="6172200" y="3886200"/>
             <a:ext cx="228600" cy="1087780"/>
           </a:xfrm>
           <a:prstGeom prst="bentConnector2">
@@ -22534,7 +22541,7 @@
         </p:nvCxnSpPr>
         <p:spPr>
           <a:xfrm rot="10800000">
-            <a:off x="6781800" y="3886200"/>
+            <a:off x="6172200" y="3886200"/>
             <a:ext cx="228600" cy="630580"/>
           </a:xfrm>
           <a:prstGeom prst="bentConnector2">
@@ -22572,7 +22579,7 @@
         </p:nvSpPr>
         <p:spPr>
           <a:xfrm>
-            <a:off x="7696200" y="4419600"/>
+            <a:off x="7086600" y="4419600"/>
             <a:ext cx="236048" cy="173380"/>
           </a:xfrm>
           <a:prstGeom prst="flowChartDecision">
@@ -22619,7 +22626,7 @@
         </p:nvSpPr>
         <p:spPr>
           <a:xfrm>
-            <a:off x="7696200" y="4876800"/>
+            <a:off x="7086600" y="4876800"/>
             <a:ext cx="236048" cy="173380"/>
           </a:xfrm>
           <a:prstGeom prst="flowChartDecision">
@@ -22666,7 +22673,7 @@
         </p:nvCxnSpPr>
         <p:spPr>
           <a:xfrm>
-            <a:off x="7884657" y="4495800"/>
+            <a:off x="7275057" y="4495800"/>
             <a:ext cx="649743" cy="12700"/>
           </a:xfrm>
           <a:prstGeom prst="bentConnector3">
@@ -22708,7 +22715,7 @@
         </p:nvCxnSpPr>
         <p:spPr>
           <a:xfrm flipV="1">
-            <a:off x="7884657" y="4943492"/>
+            <a:off x="7275057" y="4943492"/>
             <a:ext cx="649743" cy="9508"/>
           </a:xfrm>
           <a:prstGeom prst="bentConnector3">
@@ -22751,7 +22758,7 @@
         </p:nvCxnSpPr>
         <p:spPr>
           <a:xfrm rot="5400000" flipH="1" flipV="1">
-            <a:off x="7892368" y="4408148"/>
+            <a:off x="7282768" y="4408148"/>
             <a:ext cx="563888" cy="720176"/>
           </a:xfrm>
           <a:prstGeom prst="bentConnector4">
@@ -22792,7 +22799,7 @@
         </p:nvSpPr>
         <p:spPr>
           <a:xfrm>
-            <a:off x="8534400" y="2743200"/>
+            <a:off x="7924800" y="2743200"/>
             <a:ext cx="822003" cy="285783"/>
           </a:xfrm>
           <a:prstGeom prst="rect">
@@ -22850,7 +22857,7 @@
         </p:nvCxnSpPr>
         <p:spPr>
           <a:xfrm rot="5400000" flipH="1" flipV="1">
-            <a:off x="7843846" y="2967046"/>
+            <a:off x="7234246" y="2967046"/>
             <a:ext cx="771508" cy="609600"/>
           </a:xfrm>
           <a:prstGeom prst="bentConnector2">
@@ -22883,13 +22890,20 @@
     </p:spTree>
     <p:extLst>
       <p:ext uri="{BB962C8B-B14F-4D97-AF65-F5344CB8AC3E}">
-        <p14:creationId xmlns="" xmlns:p14="http://schemas.microsoft.com/office/powerpoint/2010/main" val="2396968029"/>
+        <p14:creationId xmlns:p14="http://schemas.microsoft.com/office/powerpoint/2010/main" val="2396968029"/>
       </p:ext>
     </p:extLst>
   </p:cSld>
   <p:clrMapOvr>
     <a:masterClrMapping/>
   </p:clrMapOvr>
+  <p:timing>
+    <p:tnLst>
+      <p:par>
+        <p:cTn id="1" dur="indefinite" restart="never" nodeType="tmRoot"/>
+      </p:par>
+    </p:tnLst>
+  </p:timing>
 </p:sld>
 </file>
 

</xml_diff>

<commit_message>
some update to developer guide
</commit_message>
<xml_diff>
--- a/docs/diagrams/Diagrams.pptx
+++ b/docs/diagrams/Diagrams.pptx
@@ -5,7 +5,7 @@
     <p:sldMasterId id="2147483648" r:id="rId1"/>
   </p:sldMasterIdLst>
   <p:notesMasterIdLst>
-    <p:notesMasterId r:id="rId13"/>
+    <p:notesMasterId r:id="rId15"/>
   </p:notesMasterIdLst>
   <p:sldIdLst>
     <p:sldId id="256" r:id="rId2"/>
@@ -19,6 +19,8 @@
     <p:sldId id="263" r:id="rId10"/>
     <p:sldId id="264" r:id="rId11"/>
     <p:sldId id="270" r:id="rId12"/>
+    <p:sldId id="271" r:id="rId13"/>
+    <p:sldId id="272" r:id="rId14"/>
   </p:sldIdLst>
   <p:sldSz cx="9144000" cy="6858000" type="screen4x3"/>
   <p:notesSz cx="6858000" cy="9144000"/>
@@ -119,7 +121,7 @@
   </p:defaultTextStyle>
   <p:extLst>
     <p:ext uri="{EFAFB233-063F-42B5-8137-9DF3F51BA10A}">
-      <p15:sldGuideLst xmlns:p15="http://schemas.microsoft.com/office/powerpoint/2012/main">
+      <p15:sldGuideLst xmlns:p15="http://schemas.microsoft.com/office/powerpoint/2012/main" xmlns="">
         <p15:guide id="1" orient="horz" pos="1488">
           <p15:clr>
             <a:srgbClr val="A4A3A4"/>
@@ -387,7 +389,7 @@
     </p:spTree>
     <p:extLst>
       <p:ext uri="{BB962C8B-B14F-4D97-AF65-F5344CB8AC3E}">
-        <p14:creationId xmlns:p14="http://schemas.microsoft.com/office/powerpoint/2010/main" val="2023976206"/>
+        <p14:creationId xmlns:p14="http://schemas.microsoft.com/office/powerpoint/2010/main" xmlns="" val="2023976206"/>
       </p:ext>
     </p:extLst>
   </p:cSld>
@@ -566,7 +568,7 @@
     </p:spTree>
     <p:extLst>
       <p:ext uri="{BB962C8B-B14F-4D97-AF65-F5344CB8AC3E}">
-        <p14:creationId xmlns:p14="http://schemas.microsoft.com/office/powerpoint/2010/main" val="1791593621"/>
+        <p14:creationId xmlns:p14="http://schemas.microsoft.com/office/powerpoint/2010/main" xmlns="" val="1791593621"/>
       </p:ext>
     </p:extLst>
   </p:cSld>
@@ -808,7 +810,7 @@
     </p:spTree>
     <p:extLst>
       <p:ext uri="{BB962C8B-B14F-4D97-AF65-F5344CB8AC3E}">
-        <p14:creationId xmlns:p14="http://schemas.microsoft.com/office/powerpoint/2010/main" val="3246593157"/>
+        <p14:creationId xmlns:p14="http://schemas.microsoft.com/office/powerpoint/2010/main" xmlns="" val="3246593157"/>
       </p:ext>
     </p:extLst>
   </p:cSld>
@@ -978,7 +980,7 @@
     </p:spTree>
     <p:extLst>
       <p:ext uri="{BB962C8B-B14F-4D97-AF65-F5344CB8AC3E}">
-        <p14:creationId xmlns:p14="http://schemas.microsoft.com/office/powerpoint/2010/main" val="2707025021"/>
+        <p14:creationId xmlns:p14="http://schemas.microsoft.com/office/powerpoint/2010/main" xmlns="" val="2707025021"/>
       </p:ext>
     </p:extLst>
   </p:cSld>
@@ -1158,7 +1160,7 @@
     </p:spTree>
     <p:extLst>
       <p:ext uri="{BB962C8B-B14F-4D97-AF65-F5344CB8AC3E}">
-        <p14:creationId xmlns:p14="http://schemas.microsoft.com/office/powerpoint/2010/main" val="568378986"/>
+        <p14:creationId xmlns:p14="http://schemas.microsoft.com/office/powerpoint/2010/main" xmlns="" val="568378986"/>
       </p:ext>
     </p:extLst>
   </p:cSld>
@@ -1328,7 +1330,7 @@
     </p:spTree>
     <p:extLst>
       <p:ext uri="{BB962C8B-B14F-4D97-AF65-F5344CB8AC3E}">
-        <p14:creationId xmlns:p14="http://schemas.microsoft.com/office/powerpoint/2010/main" val="266658052"/>
+        <p14:creationId xmlns:p14="http://schemas.microsoft.com/office/powerpoint/2010/main" xmlns="" val="266658052"/>
       </p:ext>
     </p:extLst>
   </p:cSld>
@@ -1575,7 +1577,7 @@
     </p:spTree>
     <p:extLst>
       <p:ext uri="{BB962C8B-B14F-4D97-AF65-F5344CB8AC3E}">
-        <p14:creationId xmlns:p14="http://schemas.microsoft.com/office/powerpoint/2010/main" val="474686344"/>
+        <p14:creationId xmlns:p14="http://schemas.microsoft.com/office/powerpoint/2010/main" xmlns="" val="474686344"/>
       </p:ext>
     </p:extLst>
   </p:cSld>
@@ -1862,7 +1864,7 @@
     </p:spTree>
     <p:extLst>
       <p:ext uri="{BB962C8B-B14F-4D97-AF65-F5344CB8AC3E}">
-        <p14:creationId xmlns:p14="http://schemas.microsoft.com/office/powerpoint/2010/main" val="562293251"/>
+        <p14:creationId xmlns:p14="http://schemas.microsoft.com/office/powerpoint/2010/main" xmlns="" val="562293251"/>
       </p:ext>
     </p:extLst>
   </p:cSld>
@@ -2283,7 +2285,7 @@
     </p:spTree>
     <p:extLst>
       <p:ext uri="{BB962C8B-B14F-4D97-AF65-F5344CB8AC3E}">
-        <p14:creationId xmlns:p14="http://schemas.microsoft.com/office/powerpoint/2010/main" val="1126424250"/>
+        <p14:creationId xmlns:p14="http://schemas.microsoft.com/office/powerpoint/2010/main" xmlns="" val="1126424250"/>
       </p:ext>
     </p:extLst>
   </p:cSld>
@@ -2402,7 +2404,7 @@
     </p:spTree>
     <p:extLst>
       <p:ext uri="{BB962C8B-B14F-4D97-AF65-F5344CB8AC3E}">
-        <p14:creationId xmlns:p14="http://schemas.microsoft.com/office/powerpoint/2010/main" val="4159724230"/>
+        <p14:creationId xmlns:p14="http://schemas.microsoft.com/office/powerpoint/2010/main" xmlns="" val="4159724230"/>
       </p:ext>
     </p:extLst>
   </p:cSld>
@@ -2499,7 +2501,7 @@
     </p:spTree>
     <p:extLst>
       <p:ext uri="{BB962C8B-B14F-4D97-AF65-F5344CB8AC3E}">
-        <p14:creationId xmlns:p14="http://schemas.microsoft.com/office/powerpoint/2010/main" val="1793928710"/>
+        <p14:creationId xmlns:p14="http://schemas.microsoft.com/office/powerpoint/2010/main" xmlns="" val="1793928710"/>
       </p:ext>
     </p:extLst>
   </p:cSld>
@@ -2776,7 +2778,7 @@
     </p:spTree>
     <p:extLst>
       <p:ext uri="{BB962C8B-B14F-4D97-AF65-F5344CB8AC3E}">
-        <p14:creationId xmlns:p14="http://schemas.microsoft.com/office/powerpoint/2010/main" val="2076802089"/>
+        <p14:creationId xmlns:p14="http://schemas.microsoft.com/office/powerpoint/2010/main" xmlns="" val="2076802089"/>
       </p:ext>
     </p:extLst>
   </p:cSld>
@@ -3030,7 +3032,7 @@
     </p:spTree>
     <p:extLst>
       <p:ext uri="{BB962C8B-B14F-4D97-AF65-F5344CB8AC3E}">
-        <p14:creationId xmlns:p14="http://schemas.microsoft.com/office/powerpoint/2010/main" val="201835938"/>
+        <p14:creationId xmlns:p14="http://schemas.microsoft.com/office/powerpoint/2010/main" xmlns="" val="201835938"/>
       </p:ext>
     </p:extLst>
   </p:cSld>
@@ -3279,7 +3281,7 @@
     </p:spTree>
     <p:extLst>
       <p:ext uri="{BB962C8B-B14F-4D97-AF65-F5344CB8AC3E}">
-        <p14:creationId xmlns:p14="http://schemas.microsoft.com/office/powerpoint/2010/main" val="2341400630"/>
+        <p14:creationId xmlns:p14="http://schemas.microsoft.com/office/powerpoint/2010/main" xmlns="" val="2341400630"/>
       </p:ext>
     </p:extLst>
   </p:cSld>
@@ -3618,7 +3620,7 @@
     </p:spTree>
     <p:extLst>
       <p:ext uri="{BB962C8B-B14F-4D97-AF65-F5344CB8AC3E}">
-        <p14:creationId xmlns:p14="http://schemas.microsoft.com/office/powerpoint/2010/main" val="2960930635"/>
+        <p14:creationId xmlns:p14="http://schemas.microsoft.com/office/powerpoint/2010/main" xmlns="" val="2960930635"/>
       </p:ext>
     </p:extLst>
   </p:cSld>
@@ -5040,7 +5042,7 @@
     </p:spTree>
     <p:extLst>
       <p:ext uri="{BB962C8B-B14F-4D97-AF65-F5344CB8AC3E}">
-        <p14:creationId xmlns:p14="http://schemas.microsoft.com/office/powerpoint/2010/main" val="1478832369"/>
+        <p14:creationId xmlns:p14="http://schemas.microsoft.com/office/powerpoint/2010/main" xmlns="" val="1478832369"/>
       </p:ext>
     </p:extLst>
   </p:cSld>
@@ -5076,14 +5078,1325 @@
       </p:grpSpPr>
       <p:sp>
         <p:nvSpPr>
+          <p:cNvPr id="4" name="Rectangle 45"/>
+          <p:cNvSpPr/>
+          <p:nvPr/>
+        </p:nvSpPr>
+        <p:spPr>
+          <a:xfrm>
+            <a:off x="1981200" y="3276600"/>
+            <a:ext cx="914400" cy="381000"/>
+          </a:xfrm>
+          <a:prstGeom prst="roundRect">
+            <a:avLst/>
+          </a:prstGeom>
+          <a:solidFill>
+            <a:srgbClr val="0070C0"/>
+          </a:solidFill>
+          <a:ln w="19050">
+            <a:solidFill>
+              <a:srgbClr val="0070C0"/>
+            </a:solidFill>
+          </a:ln>
+          <a:effectLst/>
+        </p:spPr>
+        <p:style>
+          <a:lnRef idx="1">
+            <a:schemeClr val="accent5"/>
+          </a:lnRef>
+          <a:fillRef idx="2">
+            <a:schemeClr val="accent5"/>
+          </a:fillRef>
+          <a:effectRef idx="1">
+            <a:schemeClr val="accent5"/>
+          </a:effectRef>
+          <a:fontRef idx="minor">
+            <a:schemeClr val="dk1"/>
+          </a:fontRef>
+        </p:style>
+        <p:txBody>
+          <a:bodyPr rtlCol="0" anchor="ctr"/>
+          <a:lstStyle/>
+          <a:p>
+            <a:pPr algn="ctr"/>
+            <a:r>
+              <a:rPr lang="en-US" sz="1600" dirty="0" smtClean="0">
+                <a:solidFill>
+                  <a:schemeClr val="bg1"/>
+                </a:solidFill>
+              </a:rPr>
+              <a:t>Task</a:t>
+            </a:r>
+            <a:endParaRPr lang="en-SG" sz="1600" dirty="0">
+              <a:solidFill>
+                <a:schemeClr val="bg1"/>
+              </a:solidFill>
+            </a:endParaRPr>
+          </a:p>
+        </p:txBody>
+      </p:sp>
+      <p:sp>
+        <p:nvSpPr>
+          <p:cNvPr id="10" name="Rectangle 45"/>
+          <p:cNvSpPr/>
+          <p:nvPr/>
+        </p:nvSpPr>
+        <p:spPr>
+          <a:xfrm>
+            <a:off x="3733800" y="2590800"/>
+            <a:ext cx="990600" cy="381000"/>
+          </a:xfrm>
+          <a:prstGeom prst="roundRect">
+            <a:avLst/>
+          </a:prstGeom>
+          <a:solidFill>
+            <a:srgbClr val="0070C0"/>
+          </a:solidFill>
+          <a:ln w="19050">
+            <a:solidFill>
+              <a:srgbClr val="0070C0"/>
+            </a:solidFill>
+          </a:ln>
+          <a:effectLst/>
+        </p:spPr>
+        <p:style>
+          <a:lnRef idx="1">
+            <a:schemeClr val="accent5"/>
+          </a:lnRef>
+          <a:fillRef idx="2">
+            <a:schemeClr val="accent5"/>
+          </a:fillRef>
+          <a:effectRef idx="1">
+            <a:schemeClr val="accent5"/>
+          </a:effectRef>
+          <a:fontRef idx="minor">
+            <a:schemeClr val="dk1"/>
+          </a:fontRef>
+        </p:style>
+        <p:txBody>
+          <a:bodyPr rtlCol="0" anchor="ctr"/>
+          <a:lstStyle/>
+          <a:p>
+            <a:pPr algn="ctr"/>
+            <a:r>
+              <a:rPr lang="en-US" sz="1600" dirty="0" smtClean="0">
+                <a:solidFill>
+                  <a:schemeClr val="bg1"/>
+                </a:solidFill>
+              </a:rPr>
+              <a:t>Event</a:t>
+            </a:r>
+            <a:endParaRPr lang="en-SG" sz="1600" dirty="0">
+              <a:solidFill>
+                <a:schemeClr val="bg1"/>
+              </a:solidFill>
+            </a:endParaRPr>
+          </a:p>
+        </p:txBody>
+      </p:sp>
+      <p:sp>
+        <p:nvSpPr>
+          <p:cNvPr id="11" name="Rectangle 45"/>
+          <p:cNvSpPr/>
+          <p:nvPr/>
+        </p:nvSpPr>
+        <p:spPr>
+          <a:xfrm>
+            <a:off x="3733800" y="3200400"/>
+            <a:ext cx="990600" cy="381000"/>
+          </a:xfrm>
+          <a:prstGeom prst="roundRect">
+            <a:avLst/>
+          </a:prstGeom>
+          <a:solidFill>
+            <a:srgbClr val="0070C0"/>
+          </a:solidFill>
+          <a:ln w="19050">
+            <a:solidFill>
+              <a:srgbClr val="0070C0"/>
+            </a:solidFill>
+          </a:ln>
+          <a:effectLst/>
+        </p:spPr>
+        <p:style>
+          <a:lnRef idx="1">
+            <a:schemeClr val="accent5"/>
+          </a:lnRef>
+          <a:fillRef idx="2">
+            <a:schemeClr val="accent5"/>
+          </a:fillRef>
+          <a:effectRef idx="1">
+            <a:schemeClr val="accent5"/>
+          </a:effectRef>
+          <a:fontRef idx="minor">
+            <a:schemeClr val="dk1"/>
+          </a:fontRef>
+        </p:style>
+        <p:txBody>
+          <a:bodyPr rtlCol="0" anchor="ctr"/>
+          <a:lstStyle/>
+          <a:p>
+            <a:pPr algn="ctr"/>
+            <a:r>
+              <a:rPr lang="en-US" sz="1600" dirty="0" smtClean="0">
+                <a:solidFill>
+                  <a:schemeClr val="bg1"/>
+                </a:solidFill>
+              </a:rPr>
+              <a:t>Deadline</a:t>
+            </a:r>
+            <a:endParaRPr lang="en-SG" sz="1600" dirty="0">
+              <a:solidFill>
+                <a:schemeClr val="bg1"/>
+              </a:solidFill>
+            </a:endParaRPr>
+          </a:p>
+        </p:txBody>
+      </p:sp>
+      <p:sp>
+        <p:nvSpPr>
+          <p:cNvPr id="12" name="Rectangle 45"/>
+          <p:cNvSpPr/>
+          <p:nvPr/>
+        </p:nvSpPr>
+        <p:spPr>
+          <a:xfrm>
+            <a:off x="3733800" y="1828800"/>
+            <a:ext cx="990600" cy="381000"/>
+          </a:xfrm>
+          <a:prstGeom prst="roundRect">
+            <a:avLst/>
+          </a:prstGeom>
+          <a:solidFill>
+            <a:srgbClr val="0070C0"/>
+          </a:solidFill>
+          <a:ln w="19050">
+            <a:solidFill>
+              <a:srgbClr val="0070C0"/>
+            </a:solidFill>
+          </a:ln>
+          <a:effectLst/>
+        </p:spPr>
+        <p:style>
+          <a:lnRef idx="1">
+            <a:schemeClr val="accent5"/>
+          </a:lnRef>
+          <a:fillRef idx="2">
+            <a:schemeClr val="accent5"/>
+          </a:fillRef>
+          <a:effectRef idx="1">
+            <a:schemeClr val="accent5"/>
+          </a:effectRef>
+          <a:fontRef idx="minor">
+            <a:schemeClr val="dk1"/>
+          </a:fontRef>
+        </p:style>
+        <p:txBody>
+          <a:bodyPr rtlCol="0" anchor="ctr"/>
+          <a:lstStyle/>
+          <a:p>
+            <a:pPr algn="ctr"/>
+            <a:r>
+              <a:rPr lang="en-US" sz="1600" dirty="0" smtClean="0">
+                <a:solidFill>
+                  <a:schemeClr val="bg1"/>
+                </a:solidFill>
+              </a:rPr>
+              <a:t>Block</a:t>
+            </a:r>
+            <a:endParaRPr lang="en-SG" sz="1600" dirty="0">
+              <a:solidFill>
+                <a:schemeClr val="bg1"/>
+              </a:solidFill>
+            </a:endParaRPr>
+          </a:p>
+        </p:txBody>
+      </p:sp>
+      <p:sp>
+        <p:nvSpPr>
+          <p:cNvPr id="13" name="Smiley Face 12"/>
+          <p:cNvSpPr/>
+          <p:nvPr/>
+        </p:nvSpPr>
+        <p:spPr>
+          <a:xfrm>
+            <a:off x="762000" y="3276600"/>
+            <a:ext cx="381000" cy="381000"/>
+          </a:xfrm>
+          <a:prstGeom prst="smileyFace">
+            <a:avLst/>
+          </a:prstGeom>
+          <a:solidFill>
+            <a:schemeClr val="bg1"/>
+          </a:solidFill>
+          <a:ln>
+            <a:solidFill>
+              <a:schemeClr val="tx1"/>
+            </a:solidFill>
+          </a:ln>
+        </p:spPr>
+        <p:style>
+          <a:lnRef idx="2">
+            <a:schemeClr val="accent1">
+              <a:shade val="50000"/>
+            </a:schemeClr>
+          </a:lnRef>
+          <a:fillRef idx="1">
+            <a:schemeClr val="accent1"/>
+          </a:fillRef>
+          <a:effectRef idx="0">
+            <a:schemeClr val="accent1"/>
+          </a:effectRef>
+          <a:fontRef idx="minor">
+            <a:schemeClr val="lt1"/>
+          </a:fontRef>
+        </p:style>
+        <p:txBody>
+          <a:bodyPr rtlCol="0" anchor="ctr"/>
+          <a:lstStyle/>
+          <a:p>
+            <a:pPr algn="ctr"/>
+            <a:endParaRPr lang="en-US"/>
+          </a:p>
+        </p:txBody>
+      </p:sp>
+      <p:cxnSp>
+        <p:nvCxnSpPr>
+          <p:cNvPr id="17" name="Straight Connector 16"/>
+          <p:cNvCxnSpPr>
+            <a:stCxn id="4" idx="1"/>
+            <a:endCxn id="13" idx="6"/>
+          </p:cNvCxnSpPr>
+          <p:nvPr/>
+        </p:nvCxnSpPr>
+        <p:spPr>
+          <a:xfrm flipH="1">
+            <a:off x="1143000" y="3467100"/>
+            <a:ext cx="838200" cy="0"/>
+          </a:xfrm>
+          <a:prstGeom prst="line">
+            <a:avLst/>
+          </a:prstGeom>
+        </p:spPr>
+        <p:style>
+          <a:lnRef idx="1">
+            <a:schemeClr val="accent1"/>
+          </a:lnRef>
+          <a:fillRef idx="0">
+            <a:schemeClr val="accent1"/>
+          </a:fillRef>
+          <a:effectRef idx="0">
+            <a:schemeClr val="accent1"/>
+          </a:effectRef>
+          <a:fontRef idx="minor">
+            <a:schemeClr val="tx1"/>
+          </a:fontRef>
+        </p:style>
+      </p:cxnSp>
+      <p:sp>
+        <p:nvSpPr>
+          <p:cNvPr id="19" name="TextBox 18"/>
+          <p:cNvSpPr txBox="1"/>
+          <p:nvPr/>
+        </p:nvSpPr>
+        <p:spPr>
+          <a:xfrm>
+            <a:off x="1295400" y="3200400"/>
+            <a:ext cx="1524000" cy="369332"/>
+          </a:xfrm>
+          <a:prstGeom prst="rect">
+            <a:avLst/>
+          </a:prstGeom>
+          <a:noFill/>
+        </p:spPr>
+        <p:txBody>
+          <a:bodyPr wrap="square" rtlCol="0">
+            <a:spAutoFit/>
+          </a:bodyPr>
+          <a:lstStyle/>
+          <a:p>
+            <a:r>
+              <a:rPr lang="en-US" sz="1400" dirty="0" smtClean="0"/>
+              <a:t>create</a:t>
+            </a:r>
+            <a:r>
+              <a:rPr lang="en-US" dirty="0" smtClean="0"/>
+              <a:t>*</a:t>
+            </a:r>
+            <a:endParaRPr lang="en-US" dirty="0"/>
+          </a:p>
+        </p:txBody>
+      </p:sp>
+      <p:sp>
+        <p:nvSpPr>
+          <p:cNvPr id="37" name="Rectangle 45"/>
+          <p:cNvSpPr/>
+          <p:nvPr/>
+        </p:nvSpPr>
+        <p:spPr>
+          <a:xfrm>
+            <a:off x="6096000" y="2895600"/>
+            <a:ext cx="1066800" cy="381000"/>
+          </a:xfrm>
+          <a:prstGeom prst="roundRect">
+            <a:avLst/>
+          </a:prstGeom>
+          <a:solidFill>
+            <a:srgbClr val="0070C0"/>
+          </a:solidFill>
+          <a:ln w="19050">
+            <a:solidFill>
+              <a:srgbClr val="0070C0"/>
+            </a:solidFill>
+          </a:ln>
+          <a:effectLst/>
+        </p:spPr>
+        <p:style>
+          <a:lnRef idx="1">
+            <a:schemeClr val="accent5"/>
+          </a:lnRef>
+          <a:fillRef idx="2">
+            <a:schemeClr val="accent5"/>
+          </a:fillRef>
+          <a:effectRef idx="1">
+            <a:schemeClr val="accent5"/>
+          </a:effectRef>
+          <a:fontRef idx="minor">
+            <a:schemeClr val="dk1"/>
+          </a:fontRef>
+        </p:style>
+        <p:txBody>
+          <a:bodyPr rtlCol="0" anchor="ctr"/>
+          <a:lstStyle/>
+          <a:p>
+            <a:pPr algn="ctr"/>
+            <a:r>
+              <a:rPr lang="en-US" sz="1600" dirty="0" smtClean="0">
+                <a:solidFill>
+                  <a:schemeClr val="bg1"/>
+                </a:solidFill>
+              </a:rPr>
+              <a:t>Recur</a:t>
+            </a:r>
+            <a:endParaRPr lang="en-SG" sz="1600" dirty="0">
+              <a:solidFill>
+                <a:schemeClr val="bg1"/>
+              </a:solidFill>
+            </a:endParaRPr>
+          </a:p>
+        </p:txBody>
+      </p:sp>
+      <p:cxnSp>
+        <p:nvCxnSpPr>
+          <p:cNvPr id="38" name="Elbow Connector 37"/>
+          <p:cNvCxnSpPr>
+            <a:stCxn id="10" idx="3"/>
+            <a:endCxn id="37" idx="1"/>
+          </p:cNvCxnSpPr>
+          <p:nvPr/>
+        </p:nvCxnSpPr>
+        <p:spPr>
+          <a:xfrm>
+            <a:off x="4724400" y="2781300"/>
+            <a:ext cx="1371600" cy="304800"/>
+          </a:xfrm>
+          <a:prstGeom prst="bentConnector3">
+            <a:avLst>
+              <a:gd name="adj1" fmla="val 50000"/>
+            </a:avLst>
+          </a:prstGeom>
+          <a:ln>
+            <a:tailEnd type="arrow"/>
+          </a:ln>
+        </p:spPr>
+        <p:style>
+          <a:lnRef idx="1">
+            <a:schemeClr val="accent1"/>
+          </a:lnRef>
+          <a:fillRef idx="0">
+            <a:schemeClr val="accent1"/>
+          </a:fillRef>
+          <a:effectRef idx="0">
+            <a:schemeClr val="accent1"/>
+          </a:effectRef>
+          <a:fontRef idx="minor">
+            <a:schemeClr val="tx1"/>
+          </a:fontRef>
+        </p:style>
+      </p:cxnSp>
+      <p:cxnSp>
+        <p:nvCxnSpPr>
+          <p:cNvPr id="41" name="Elbow Connector 40"/>
+          <p:cNvCxnSpPr>
+            <a:stCxn id="11" idx="3"/>
+            <a:endCxn id="37" idx="1"/>
+          </p:cNvCxnSpPr>
+          <p:nvPr/>
+        </p:nvCxnSpPr>
+        <p:spPr>
+          <a:xfrm flipV="1">
+            <a:off x="4724400" y="3086100"/>
+            <a:ext cx="1371600" cy="304800"/>
+          </a:xfrm>
+          <a:prstGeom prst="bentConnector3">
+            <a:avLst>
+              <a:gd name="adj1" fmla="val 50000"/>
+            </a:avLst>
+          </a:prstGeom>
+          <a:ln>
+            <a:tailEnd type="arrow"/>
+          </a:ln>
+        </p:spPr>
+        <p:style>
+          <a:lnRef idx="1">
+            <a:schemeClr val="accent1"/>
+          </a:lnRef>
+          <a:fillRef idx="0">
+            <a:schemeClr val="accent1"/>
+          </a:fillRef>
+          <a:effectRef idx="0">
+            <a:schemeClr val="accent1"/>
+          </a:effectRef>
+          <a:fontRef idx="minor">
+            <a:schemeClr val="tx1"/>
+          </a:fontRef>
+        </p:style>
+      </p:cxnSp>
+      <p:sp>
+        <p:nvSpPr>
+          <p:cNvPr id="44" name="TextBox 43"/>
+          <p:cNvSpPr txBox="1"/>
+          <p:nvPr/>
+        </p:nvSpPr>
+        <p:spPr>
+          <a:xfrm>
+            <a:off x="5334000" y="2819400"/>
+            <a:ext cx="838200" cy="369332"/>
+          </a:xfrm>
+          <a:prstGeom prst="rect">
+            <a:avLst/>
+          </a:prstGeom>
+          <a:noFill/>
+        </p:spPr>
+        <p:txBody>
+          <a:bodyPr wrap="square" rtlCol="0">
+            <a:spAutoFit/>
+          </a:bodyPr>
+          <a:lstStyle/>
+          <a:p>
+            <a:r>
+              <a:rPr lang="en-US" sz="1200" dirty="0" smtClean="0"/>
+              <a:t>Can be   </a:t>
+            </a:r>
+            <a:r>
+              <a:rPr lang="en-US" dirty="0" smtClean="0"/>
+              <a:t>*</a:t>
+            </a:r>
+            <a:endParaRPr lang="en-US" dirty="0"/>
+          </a:p>
+        </p:txBody>
+      </p:sp>
+      <p:sp>
+        <p:nvSpPr>
+          <p:cNvPr id="47" name="Isosceles Triangle 46"/>
+          <p:cNvSpPr/>
+          <p:nvPr/>
+        </p:nvSpPr>
+        <p:spPr>
+          <a:xfrm rot="16200000">
+            <a:off x="2857500" y="3390900"/>
+            <a:ext cx="190500" cy="114300"/>
+          </a:xfrm>
+          <a:prstGeom prst="triangle">
+            <a:avLst/>
+          </a:prstGeom>
+        </p:spPr>
+        <p:style>
+          <a:lnRef idx="2">
+            <a:schemeClr val="accent1"/>
+          </a:lnRef>
+          <a:fillRef idx="1">
+            <a:schemeClr val="lt1"/>
+          </a:fillRef>
+          <a:effectRef idx="0">
+            <a:schemeClr val="accent1"/>
+          </a:effectRef>
+          <a:fontRef idx="minor">
+            <a:schemeClr val="dk1"/>
+          </a:fontRef>
+        </p:style>
+        <p:txBody>
+          <a:bodyPr rtlCol="0" anchor="ctr"/>
+          <a:lstStyle/>
+          <a:p>
+            <a:pPr algn="ctr"/>
+            <a:endParaRPr lang="en-US"/>
+          </a:p>
+        </p:txBody>
+      </p:sp>
+      <p:sp>
+        <p:nvSpPr>
+          <p:cNvPr id="48" name="Isosceles Triangle 47"/>
+          <p:cNvSpPr/>
+          <p:nvPr/>
+        </p:nvSpPr>
+        <p:spPr>
+          <a:xfrm rot="10800000">
+            <a:off x="4114800" y="2438400"/>
+            <a:ext cx="228600" cy="152400"/>
+          </a:xfrm>
+          <a:prstGeom prst="triangle">
+            <a:avLst/>
+          </a:prstGeom>
+        </p:spPr>
+        <p:style>
+          <a:lnRef idx="2">
+            <a:schemeClr val="accent1"/>
+          </a:lnRef>
+          <a:fillRef idx="1">
+            <a:schemeClr val="lt1"/>
+          </a:fillRef>
+          <a:effectRef idx="0">
+            <a:schemeClr val="accent1"/>
+          </a:effectRef>
+          <a:fontRef idx="minor">
+            <a:schemeClr val="dk1"/>
+          </a:fontRef>
+        </p:style>
+        <p:txBody>
+          <a:bodyPr rtlCol="0" anchor="ctr"/>
+          <a:lstStyle/>
+          <a:p>
+            <a:pPr algn="ctr"/>
+            <a:endParaRPr lang="en-US"/>
+          </a:p>
+        </p:txBody>
+      </p:sp>
+      <p:cxnSp>
+        <p:nvCxnSpPr>
+          <p:cNvPr id="52" name="Straight Connector 51"/>
+          <p:cNvCxnSpPr>
+            <a:stCxn id="12" idx="2"/>
+            <a:endCxn id="48" idx="3"/>
+          </p:cNvCxnSpPr>
+          <p:nvPr/>
+        </p:nvCxnSpPr>
+        <p:spPr>
+          <a:xfrm>
+            <a:off x="4229100" y="2209800"/>
+            <a:ext cx="0" cy="228600"/>
+          </a:xfrm>
+          <a:prstGeom prst="line">
+            <a:avLst/>
+          </a:prstGeom>
+        </p:spPr>
+        <p:style>
+          <a:lnRef idx="1">
+            <a:schemeClr val="accent1"/>
+          </a:lnRef>
+          <a:fillRef idx="0">
+            <a:schemeClr val="accent1"/>
+          </a:fillRef>
+          <a:effectRef idx="0">
+            <a:schemeClr val="accent1"/>
+          </a:effectRef>
+          <a:fontRef idx="minor">
+            <a:schemeClr val="tx1"/>
+          </a:fontRef>
+        </p:style>
+      </p:cxnSp>
+      <p:cxnSp>
+        <p:nvCxnSpPr>
+          <p:cNvPr id="54" name="Straight Connector 53"/>
+          <p:cNvCxnSpPr>
+            <a:stCxn id="47" idx="3"/>
+            <a:endCxn id="11" idx="1"/>
+          </p:cNvCxnSpPr>
+          <p:nvPr/>
+        </p:nvCxnSpPr>
+        <p:spPr>
+          <a:xfrm flipV="1">
+            <a:off x="3009900" y="3390900"/>
+            <a:ext cx="723900" cy="57150"/>
+          </a:xfrm>
+          <a:prstGeom prst="line">
+            <a:avLst/>
+          </a:prstGeom>
+        </p:spPr>
+        <p:style>
+          <a:lnRef idx="1">
+            <a:schemeClr val="accent1"/>
+          </a:lnRef>
+          <a:fillRef idx="0">
+            <a:schemeClr val="accent1"/>
+          </a:fillRef>
+          <a:effectRef idx="0">
+            <a:schemeClr val="accent1"/>
+          </a:effectRef>
+          <a:fontRef idx="minor">
+            <a:schemeClr val="tx1"/>
+          </a:fontRef>
+        </p:style>
+      </p:cxnSp>
+      <p:cxnSp>
+        <p:nvCxnSpPr>
+          <p:cNvPr id="57" name="Straight Connector 56"/>
+          <p:cNvCxnSpPr>
+            <a:stCxn id="10" idx="1"/>
+            <a:endCxn id="47" idx="3"/>
+          </p:cNvCxnSpPr>
+          <p:nvPr/>
+        </p:nvCxnSpPr>
+        <p:spPr>
+          <a:xfrm flipH="1">
+            <a:off x="3009900" y="2781300"/>
+            <a:ext cx="723900" cy="666750"/>
+          </a:xfrm>
+          <a:prstGeom prst="line">
+            <a:avLst/>
+          </a:prstGeom>
+        </p:spPr>
+        <p:style>
+          <a:lnRef idx="1">
+            <a:schemeClr val="accent1"/>
+          </a:lnRef>
+          <a:fillRef idx="0">
+            <a:schemeClr val="accent1"/>
+          </a:fillRef>
+          <a:effectRef idx="0">
+            <a:schemeClr val="accent1"/>
+          </a:effectRef>
+          <a:fontRef idx="minor">
+            <a:schemeClr val="tx1"/>
+          </a:fontRef>
+        </p:style>
+      </p:cxnSp>
+    </p:spTree>
+  </p:cSld>
+  <p:clrMapOvr>
+    <a:masterClrMapping/>
+  </p:clrMapOvr>
+</p:sld>
+</file>
+
+<file path=ppt/slides/slide12.xml><?xml version="1.0" encoding="utf-8"?>
+<p:sld xmlns:a="http://schemas.openxmlformats.org/drawingml/2006/main" xmlns:r="http://schemas.openxmlformats.org/officeDocument/2006/relationships" xmlns:p="http://schemas.openxmlformats.org/presentationml/2006/main">
+  <p:cSld>
+    <p:spTree>
+      <p:nvGrpSpPr>
+        <p:cNvPr id="1" name=""/>
+        <p:cNvGrpSpPr/>
+        <p:nvPr/>
+      </p:nvGrpSpPr>
+      <p:grpSpPr>
+        <a:xfrm>
+          <a:off x="0" y="0"/>
+          <a:ext cx="0" cy="0"/>
+          <a:chOff x="0" y="0"/>
+          <a:chExt cx="0" cy="0"/>
+        </a:xfrm>
+      </p:grpSpPr>
+      <p:sp>
+        <p:nvSpPr>
+          <p:cNvPr id="2" name="Rectangle 65"/>
+          <p:cNvSpPr/>
+          <p:nvPr/>
+        </p:nvSpPr>
+        <p:spPr>
+          <a:xfrm>
+            <a:off x="1295400" y="1524000"/>
+            <a:ext cx="3124200" cy="3048000"/>
+          </a:xfrm>
+          <a:prstGeom prst="roundRect">
+            <a:avLst>
+              <a:gd name="adj" fmla="val 3484"/>
+            </a:avLst>
+          </a:prstGeom>
+          <a:solidFill>
+            <a:schemeClr val="accent4">
+              <a:lumMod val="20000"/>
+              <a:lumOff val="80000"/>
+            </a:schemeClr>
+          </a:solidFill>
+          <a:ln w="19050">
+            <a:noFill/>
+          </a:ln>
+          <a:effectLst/>
+        </p:spPr>
+        <p:style>
+          <a:lnRef idx="1">
+            <a:schemeClr val="accent2"/>
+          </a:lnRef>
+          <a:fillRef idx="2">
+            <a:schemeClr val="accent2"/>
+          </a:fillRef>
+          <a:effectRef idx="1">
+            <a:schemeClr val="accent2"/>
+          </a:effectRef>
+          <a:fontRef idx="minor">
+            <a:schemeClr val="dk1"/>
+          </a:fontRef>
+        </p:style>
+        <p:txBody>
+          <a:bodyPr rtlCol="0" anchor="t"/>
+          <a:lstStyle/>
+          <a:p>
+            <a:r>
+              <a:rPr lang="en-US" sz="1200" b="1" dirty="0">
+                <a:solidFill>
+                  <a:srgbClr val="7030A0"/>
+                </a:solidFill>
+              </a:rPr>
+              <a:t>Model</a:t>
+            </a:r>
+            <a:endParaRPr lang="en-SG" sz="1200" b="1" dirty="0">
+              <a:solidFill>
+                <a:srgbClr val="7030A0"/>
+              </a:solidFill>
+            </a:endParaRPr>
+          </a:p>
+        </p:txBody>
+      </p:sp>
+      <p:sp>
+        <p:nvSpPr>
+          <p:cNvPr id="3" name="Rectangle 62"/>
+          <p:cNvSpPr/>
+          <p:nvPr/>
+        </p:nvSpPr>
+        <p:spPr>
+          <a:xfrm>
+            <a:off x="2362200" y="1752600"/>
+            <a:ext cx="1093635" cy="346760"/>
+          </a:xfrm>
+          <a:prstGeom prst="rect">
+            <a:avLst/>
+          </a:prstGeom>
+          <a:solidFill>
+            <a:srgbClr val="7030A0"/>
+          </a:solidFill>
+          <a:ln w="19050">
+            <a:solidFill>
+              <a:srgbClr val="7030A0"/>
+            </a:solidFill>
+          </a:ln>
+          <a:effectLst/>
+        </p:spPr>
+        <p:style>
+          <a:lnRef idx="1">
+            <a:schemeClr val="accent2"/>
+          </a:lnRef>
+          <a:fillRef idx="2">
+            <a:schemeClr val="accent2"/>
+          </a:fillRef>
+          <a:effectRef idx="1">
+            <a:schemeClr val="accent2"/>
+          </a:effectRef>
+          <a:fontRef idx="minor">
+            <a:schemeClr val="dk1"/>
+          </a:fontRef>
+        </p:style>
+        <p:txBody>
+          <a:bodyPr rtlCol="0" anchor="ctr"/>
+          <a:lstStyle/>
+          <a:p>
+            <a:pPr algn="ctr"/>
+            <a:r>
+              <a:rPr lang="en-US" sz="1050" dirty="0">
+                <a:solidFill>
+                  <a:schemeClr val="bg1"/>
+                </a:solidFill>
+              </a:rPr>
+              <a:t>&lt;&lt;interface&gt;&gt;</a:t>
+            </a:r>
+          </a:p>
+          <a:p>
+            <a:pPr algn="ctr"/>
+            <a:r>
+              <a:rPr lang="en-US" sz="1050" dirty="0">
+                <a:solidFill>
+                  <a:schemeClr val="bg1"/>
+                </a:solidFill>
+              </a:rPr>
+              <a:t>Model</a:t>
+            </a:r>
+            <a:endParaRPr lang="en-SG" sz="1050" dirty="0">
+              <a:solidFill>
+                <a:schemeClr val="bg1"/>
+              </a:solidFill>
+            </a:endParaRPr>
+          </a:p>
+        </p:txBody>
+      </p:sp>
+      <p:sp>
+        <p:nvSpPr>
+          <p:cNvPr id="13" name="Rectangle 8"/>
+          <p:cNvSpPr/>
+          <p:nvPr/>
+        </p:nvSpPr>
+        <p:spPr>
+          <a:xfrm>
+            <a:off x="1676400" y="3581400"/>
+            <a:ext cx="1093635" cy="346760"/>
+          </a:xfrm>
+          <a:prstGeom prst="rect">
+            <a:avLst/>
+          </a:prstGeom>
+          <a:solidFill>
+            <a:srgbClr val="7030A0"/>
+          </a:solidFill>
+          <a:ln w="19050">
+            <a:solidFill>
+              <a:srgbClr val="7030A0"/>
+            </a:solidFill>
+          </a:ln>
+          <a:effectLst/>
+        </p:spPr>
+        <p:style>
+          <a:lnRef idx="1">
+            <a:schemeClr val="accent2"/>
+          </a:lnRef>
+          <a:fillRef idx="2">
+            <a:schemeClr val="accent2"/>
+          </a:fillRef>
+          <a:effectRef idx="1">
+            <a:schemeClr val="accent2"/>
+          </a:effectRef>
+          <a:fontRef idx="minor">
+            <a:schemeClr val="dk1"/>
+          </a:fontRef>
+        </p:style>
+        <p:txBody>
+          <a:bodyPr rtlCol="0" anchor="ctr"/>
+          <a:lstStyle/>
+          <a:p>
+            <a:pPr algn="ctr"/>
+            <a:r>
+              <a:rPr lang="en-US" sz="1050" dirty="0" err="1" smtClean="0">
+                <a:solidFill>
+                  <a:schemeClr val="bg1"/>
+                </a:solidFill>
+              </a:rPr>
+              <a:t>Config</a:t>
+            </a:r>
+            <a:endParaRPr lang="en-SG" sz="1050" dirty="0">
+              <a:solidFill>
+                <a:schemeClr val="bg1"/>
+              </a:solidFill>
+            </a:endParaRPr>
+          </a:p>
+        </p:txBody>
+      </p:sp>
+      <p:sp>
+        <p:nvSpPr>
+          <p:cNvPr id="14" name="Rectangle 62"/>
+          <p:cNvSpPr/>
+          <p:nvPr/>
+        </p:nvSpPr>
+        <p:spPr>
+          <a:xfrm>
+            <a:off x="2286000" y="2743200"/>
+            <a:ext cx="1169835" cy="346760"/>
+          </a:xfrm>
+          <a:prstGeom prst="rect">
+            <a:avLst/>
+          </a:prstGeom>
+          <a:solidFill>
+            <a:srgbClr val="7030A0"/>
+          </a:solidFill>
+          <a:ln w="19050">
+            <a:solidFill>
+              <a:srgbClr val="7030A0"/>
+            </a:solidFill>
+          </a:ln>
+          <a:effectLst/>
+        </p:spPr>
+        <p:style>
+          <a:lnRef idx="1">
+            <a:schemeClr val="accent2"/>
+          </a:lnRef>
+          <a:fillRef idx="2">
+            <a:schemeClr val="accent2"/>
+          </a:fillRef>
+          <a:effectRef idx="1">
+            <a:schemeClr val="accent2"/>
+          </a:effectRef>
+          <a:fontRef idx="minor">
+            <a:schemeClr val="dk1"/>
+          </a:fontRef>
+        </p:style>
+        <p:txBody>
+          <a:bodyPr rtlCol="0" anchor="ctr"/>
+          <a:lstStyle/>
+          <a:p>
+            <a:pPr algn="ctr"/>
+            <a:r>
+              <a:rPr lang="en-US" sz="1050" dirty="0" err="1">
+                <a:solidFill>
+                  <a:schemeClr val="bg1"/>
+                </a:solidFill>
+              </a:rPr>
+              <a:t>ModelManager</a:t>
+            </a:r>
+            <a:endParaRPr lang="en-SG" sz="1050" dirty="0">
+              <a:solidFill>
+                <a:schemeClr val="bg1"/>
+              </a:solidFill>
+            </a:endParaRPr>
+          </a:p>
+        </p:txBody>
+      </p:sp>
+      <p:sp>
+        <p:nvSpPr>
+          <p:cNvPr id="15" name="Isosceles Triangle 102"/>
+          <p:cNvSpPr/>
+          <p:nvPr/>
+        </p:nvSpPr>
+        <p:spPr>
+          <a:xfrm>
+            <a:off x="2743200" y="2133600"/>
+            <a:ext cx="270504" cy="175523"/>
+          </a:xfrm>
+          <a:prstGeom prst="triangle">
+            <a:avLst/>
+          </a:prstGeom>
+          <a:solidFill>
+            <a:srgbClr val="7030A0"/>
+          </a:solidFill>
+          <a:ln w="19050">
+            <a:solidFill>
+              <a:srgbClr val="7030A0"/>
+            </a:solidFill>
+          </a:ln>
+          <a:effectLst/>
+        </p:spPr>
+        <p:style>
+          <a:lnRef idx="1">
+            <a:schemeClr val="accent6"/>
+          </a:lnRef>
+          <a:fillRef idx="2">
+            <a:schemeClr val="accent6"/>
+          </a:fillRef>
+          <a:effectRef idx="1">
+            <a:schemeClr val="accent6"/>
+          </a:effectRef>
+          <a:fontRef idx="minor">
+            <a:schemeClr val="dk1"/>
+          </a:fontRef>
+        </p:style>
+        <p:txBody>
+          <a:bodyPr rtlCol="0" anchor="ctr"/>
+          <a:lstStyle/>
+          <a:p>
+            <a:pPr algn="ctr"/>
+            <a:endParaRPr lang="en-SG" sz="1050"/>
+          </a:p>
+        </p:txBody>
+      </p:sp>
+      <p:cxnSp>
+        <p:nvCxnSpPr>
+          <p:cNvPr id="16" name="Straight Arrow Connector 15"/>
+          <p:cNvCxnSpPr>
+            <a:stCxn id="17" idx="2"/>
+            <a:endCxn id="13" idx="0"/>
+          </p:cNvCxnSpPr>
+          <p:nvPr/>
+        </p:nvCxnSpPr>
+        <p:spPr>
+          <a:xfrm flipH="1">
+            <a:off x="2223218" y="3297580"/>
+            <a:ext cx="333206" cy="283820"/>
+          </a:xfrm>
+          <a:prstGeom prst="straightConnector1">
+            <a:avLst/>
+          </a:prstGeom>
+          <a:ln w="19050">
+            <a:solidFill>
+              <a:srgbClr val="7030A0"/>
+            </a:solidFill>
+            <a:headEnd type="none" w="med" len="med"/>
+            <a:tailEnd type="arrow" w="med" len="med"/>
+          </a:ln>
+          <a:effectLst/>
+        </p:spPr>
+        <p:style>
+          <a:lnRef idx="1">
+            <a:schemeClr val="accent2"/>
+          </a:lnRef>
+          <a:fillRef idx="2">
+            <a:schemeClr val="accent2"/>
+          </a:fillRef>
+          <a:effectRef idx="1">
+            <a:schemeClr val="accent2"/>
+          </a:effectRef>
+          <a:fontRef idx="minor">
+            <a:schemeClr val="dk1"/>
+          </a:fontRef>
+        </p:style>
+      </p:cxnSp>
+      <p:sp>
+        <p:nvSpPr>
+          <p:cNvPr id="17" name="Flowchart: Decision 96"/>
+          <p:cNvSpPr/>
+          <p:nvPr/>
+        </p:nvSpPr>
+        <p:spPr>
+          <a:xfrm>
+            <a:off x="2438400" y="3124200"/>
+            <a:ext cx="236048" cy="173380"/>
+          </a:xfrm>
+          <a:prstGeom prst="flowChartDecision">
+            <a:avLst/>
+          </a:prstGeom>
+          <a:noFill/>
+          <a:ln w="19050">
+            <a:solidFill>
+              <a:srgbClr val="7030A0"/>
+            </a:solidFill>
+          </a:ln>
+          <a:effectLst/>
+        </p:spPr>
+        <p:style>
+          <a:lnRef idx="1">
+            <a:schemeClr val="accent6"/>
+          </a:lnRef>
+          <a:fillRef idx="2">
+            <a:schemeClr val="accent6"/>
+          </a:fillRef>
+          <a:effectRef idx="1">
+            <a:schemeClr val="accent6"/>
+          </a:effectRef>
+          <a:fontRef idx="minor">
+            <a:schemeClr val="dk1"/>
+          </a:fontRef>
+        </p:style>
+        <p:txBody>
+          <a:bodyPr rtlCol="0" anchor="ctr"/>
+          <a:lstStyle/>
+          <a:p>
+            <a:pPr algn="ctr"/>
+            <a:endParaRPr lang="en-US" sz="1050"/>
+          </a:p>
+        </p:txBody>
+      </p:sp>
+      <p:sp>
+        <p:nvSpPr>
+          <p:cNvPr id="18" name="Rectangle 8"/>
+          <p:cNvSpPr/>
+          <p:nvPr/>
+        </p:nvSpPr>
+        <p:spPr>
+          <a:xfrm>
+            <a:off x="2895600" y="3581400"/>
+            <a:ext cx="1093635" cy="346760"/>
+          </a:xfrm>
+          <a:prstGeom prst="rect">
+            <a:avLst/>
+          </a:prstGeom>
+          <a:ln w="19050">
+            <a:solidFill>
+              <a:srgbClr val="7030A0"/>
+            </a:solidFill>
+          </a:ln>
+          <a:effectLst/>
+        </p:spPr>
+        <p:style>
+          <a:lnRef idx="1">
+            <a:schemeClr val="accent4"/>
+          </a:lnRef>
+          <a:fillRef idx="2">
+            <a:schemeClr val="accent4"/>
+          </a:fillRef>
+          <a:effectRef idx="1">
+            <a:schemeClr val="accent4"/>
+          </a:effectRef>
+          <a:fontRef idx="minor">
+            <a:schemeClr val="dk1"/>
+          </a:fontRef>
+        </p:style>
+        <p:txBody>
+          <a:bodyPr rtlCol="0" anchor="ctr"/>
+          <a:lstStyle/>
+          <a:p>
+            <a:pPr algn="ctr"/>
+            <a:r>
+              <a:rPr lang="en-US" sz="1050" dirty="0" err="1">
+                <a:solidFill>
+                  <a:srgbClr val="7030A0"/>
+                </a:solidFill>
+              </a:rPr>
+              <a:t>TaskForce</a:t>
+            </a:r>
+            <a:endParaRPr lang="en-SG" sz="1050" dirty="0">
+              <a:solidFill>
+                <a:srgbClr val="7030A0"/>
+              </a:solidFill>
+            </a:endParaRPr>
+          </a:p>
+        </p:txBody>
+      </p:sp>
+      <p:cxnSp>
+        <p:nvCxnSpPr>
+          <p:cNvPr id="19" name="Straight Arrow Connector 18"/>
+          <p:cNvCxnSpPr>
+            <a:stCxn id="20" idx="2"/>
+            <a:endCxn id="18" idx="0"/>
+          </p:cNvCxnSpPr>
+          <p:nvPr/>
+        </p:nvCxnSpPr>
+        <p:spPr>
+          <a:xfrm>
+            <a:off x="3242224" y="3297580"/>
+            <a:ext cx="200194" cy="283820"/>
+          </a:xfrm>
+          <a:prstGeom prst="straightConnector1">
+            <a:avLst/>
+          </a:prstGeom>
+          <a:ln w="19050">
+            <a:solidFill>
+              <a:srgbClr val="7030A0"/>
+            </a:solidFill>
+            <a:headEnd type="none" w="med" len="med"/>
+            <a:tailEnd type="arrow" w="med" len="med"/>
+          </a:ln>
+          <a:effectLst/>
+        </p:spPr>
+        <p:style>
+          <a:lnRef idx="1">
+            <a:schemeClr val="accent2"/>
+          </a:lnRef>
+          <a:fillRef idx="2">
+            <a:schemeClr val="accent2"/>
+          </a:fillRef>
+          <a:effectRef idx="1">
+            <a:schemeClr val="accent2"/>
+          </a:effectRef>
+          <a:fontRef idx="minor">
+            <a:schemeClr val="dk1"/>
+          </a:fontRef>
+        </p:style>
+      </p:cxnSp>
+      <p:sp>
+        <p:nvSpPr>
+          <p:cNvPr id="20" name="Flowchart: Decision 96"/>
+          <p:cNvSpPr/>
+          <p:nvPr/>
+        </p:nvSpPr>
+        <p:spPr>
+          <a:xfrm>
+            <a:off x="3124200" y="3124200"/>
+            <a:ext cx="236048" cy="173380"/>
+          </a:xfrm>
+          <a:prstGeom prst="flowChartDecision">
+            <a:avLst/>
+          </a:prstGeom>
+          <a:noFill/>
+          <a:ln w="19050">
+            <a:solidFill>
+              <a:srgbClr val="7030A0"/>
+            </a:solidFill>
+          </a:ln>
+          <a:effectLst/>
+        </p:spPr>
+        <p:style>
+          <a:lnRef idx="1">
+            <a:schemeClr val="accent6"/>
+          </a:lnRef>
+          <a:fillRef idx="2">
+            <a:schemeClr val="accent6"/>
+          </a:fillRef>
+          <a:effectRef idx="1">
+            <a:schemeClr val="accent6"/>
+          </a:effectRef>
+          <a:fontRef idx="minor">
+            <a:schemeClr val="dk1"/>
+          </a:fontRef>
+        </p:style>
+        <p:txBody>
+          <a:bodyPr rtlCol="0" anchor="ctr"/>
+          <a:lstStyle/>
+          <a:p>
+            <a:pPr algn="ctr"/>
+            <a:endParaRPr lang="en-US" sz="1050"/>
+          </a:p>
+        </p:txBody>
+      </p:sp>
+      <p:cxnSp>
+        <p:nvCxnSpPr>
+          <p:cNvPr id="29" name="Straight Connector 28"/>
+          <p:cNvCxnSpPr>
+            <a:stCxn id="15" idx="3"/>
+            <a:endCxn id="14" idx="0"/>
+          </p:cNvCxnSpPr>
+          <p:nvPr/>
+        </p:nvCxnSpPr>
+        <p:spPr>
+          <a:xfrm flipH="1">
+            <a:off x="2870918" y="2309123"/>
+            <a:ext cx="7534" cy="434077"/>
+          </a:xfrm>
+          <a:prstGeom prst="line">
+            <a:avLst/>
+          </a:prstGeom>
+          <a:ln w="19050">
+            <a:solidFill>
+              <a:srgbClr val="7030A0"/>
+            </a:solidFill>
+            <a:prstDash val="sysDot"/>
+            <a:headEnd type="none" w="med" len="med"/>
+            <a:tailEnd type="none" w="med" len="med"/>
+          </a:ln>
+          <a:effectLst/>
+        </p:spPr>
+        <p:style>
+          <a:lnRef idx="1">
+            <a:schemeClr val="accent2"/>
+          </a:lnRef>
+          <a:fillRef idx="2">
+            <a:schemeClr val="accent2"/>
+          </a:fillRef>
+          <a:effectRef idx="1">
+            <a:schemeClr val="accent2"/>
+          </a:effectRef>
+          <a:fontRef idx="minor">
+            <a:schemeClr val="dk1"/>
+          </a:fontRef>
+        </p:style>
+      </p:cxnSp>
+    </p:spTree>
+  </p:cSld>
+  <p:clrMapOvr>
+    <a:masterClrMapping/>
+  </p:clrMapOvr>
+</p:sld>
+</file>
+
+<file path=ppt/slides/slide13.xml><?xml version="1.0" encoding="utf-8"?>
+<p:sld xmlns:a="http://schemas.openxmlformats.org/drawingml/2006/main" xmlns:r="http://schemas.openxmlformats.org/officeDocument/2006/relationships" xmlns:p="http://schemas.openxmlformats.org/presentationml/2006/main">
+  <p:cSld>
+    <p:spTree>
+      <p:nvGrpSpPr>
+        <p:cNvPr id="1" name=""/>
+        <p:cNvGrpSpPr/>
+        <p:nvPr/>
+      </p:nvGrpSpPr>
+      <p:grpSpPr>
+        <a:xfrm>
+          <a:off x="0" y="0"/>
+          <a:ext cx="0" cy="0"/>
+          <a:chOff x="0" y="0"/>
+          <a:chExt cx="0" cy="0"/>
+        </a:xfrm>
+      </p:grpSpPr>
+      <p:sp>
+        <p:nvSpPr>
           <p:cNvPr id="2" name="Rounded Rectangle 1"/>
           <p:cNvSpPr/>
           <p:nvPr/>
         </p:nvSpPr>
         <p:spPr>
           <a:xfrm>
-            <a:off x="1676400" y="1828800"/>
-            <a:ext cx="5700181" cy="3124200"/>
+            <a:off x="1524000" y="2057400"/>
+            <a:ext cx="7620000" cy="2667000"/>
           </a:xfrm>
           <a:prstGeom prst="roundRect">
             <a:avLst>
@@ -5130,37 +6443,85 @@
       </p:sp>
       <p:sp>
         <p:nvSpPr>
-          <p:cNvPr id="4" name="Rectangle 45"/>
+          <p:cNvPr id="5" name="Smiley Face 4"/>
           <p:cNvSpPr/>
           <p:nvPr/>
         </p:nvSpPr>
         <p:spPr>
           <a:xfrm>
-            <a:off x="1981200" y="3276600"/>
-            <a:ext cx="914400" cy="381000"/>
+            <a:off x="1143000" y="3276600"/>
+            <a:ext cx="381000" cy="381000"/>
+          </a:xfrm>
+          <a:prstGeom prst="smileyFace">
+            <a:avLst/>
+          </a:prstGeom>
+          <a:solidFill>
+            <a:schemeClr val="bg1"/>
+          </a:solidFill>
+          <a:ln>
+            <a:solidFill>
+              <a:schemeClr val="tx1"/>
+            </a:solidFill>
+          </a:ln>
+        </p:spPr>
+        <p:style>
+          <a:lnRef idx="2">
+            <a:schemeClr val="accent1">
+              <a:shade val="50000"/>
+            </a:schemeClr>
+          </a:lnRef>
+          <a:fillRef idx="1">
+            <a:schemeClr val="accent1"/>
+          </a:fillRef>
+          <a:effectRef idx="0">
+            <a:schemeClr val="accent1"/>
+          </a:effectRef>
+          <a:fontRef idx="minor">
+            <a:schemeClr val="lt1"/>
+          </a:fontRef>
+        </p:style>
+        <p:txBody>
+          <a:bodyPr rtlCol="0" anchor="ctr"/>
+          <a:lstStyle/>
+          <a:p>
+            <a:pPr algn="ctr"/>
+            <a:endParaRPr lang="en-US"/>
+          </a:p>
+        </p:txBody>
+      </p:sp>
+      <p:sp>
+        <p:nvSpPr>
+          <p:cNvPr id="28" name="Rectangle 62"/>
+          <p:cNvSpPr/>
+          <p:nvPr/>
+        </p:nvSpPr>
+        <p:spPr>
+          <a:xfrm flipH="1">
+            <a:off x="1981200" y="2819400"/>
+            <a:ext cx="609602" cy="1294917"/>
           </a:xfrm>
           <a:prstGeom prst="roundRect">
             <a:avLst/>
           </a:prstGeom>
           <a:solidFill>
-            <a:srgbClr val="0070C0"/>
+            <a:srgbClr val="00B050"/>
           </a:solidFill>
           <a:ln w="19050">
             <a:solidFill>
-              <a:srgbClr val="0070C0"/>
-            </a:solidFill>
-          </a:ln>
-          <a:effectLst/>
-        </p:spPr>
-        <p:style>
-          <a:lnRef idx="1">
-            <a:schemeClr val="accent5"/>
-          </a:lnRef>
-          <a:fillRef idx="2">
-            <a:schemeClr val="accent5"/>
-          </a:fillRef>
-          <a:effectRef idx="1">
-            <a:schemeClr val="accent5"/>
+              <a:srgbClr val="00B050"/>
+            </a:solidFill>
+          </a:ln>
+          <a:effectLst/>
+        </p:spPr>
+        <p:style>
+          <a:lnRef idx="1">
+            <a:schemeClr val="accent2"/>
+          </a:lnRef>
+          <a:fillRef idx="2">
+            <a:schemeClr val="accent2"/>
+          </a:fillRef>
+          <a:effectRef idx="1">
+            <a:schemeClr val="accent2"/>
           </a:effectRef>
           <a:fontRef idx="minor">
             <a:schemeClr val="dk1"/>
@@ -5172,12 +6533,12 @@
           <a:p>
             <a:pPr algn="ctr"/>
             <a:r>
-              <a:rPr lang="en-US" sz="1600" dirty="0" smtClean="0">
+              <a:rPr lang="en-US" sz="1600" dirty="0">
                 <a:solidFill>
                   <a:schemeClr val="bg1"/>
                 </a:solidFill>
               </a:rPr>
-              <a:t>Task</a:t>
+              <a:t>UI</a:t>
             </a:r>
             <a:endParaRPr lang="en-SG" sz="1600" dirty="0">
               <a:solidFill>
@@ -5187,16 +6548,53 @@
           </a:p>
         </p:txBody>
       </p:sp>
-      <p:sp>
-        <p:nvSpPr>
-          <p:cNvPr id="10" name="Rectangle 45"/>
+      <p:cxnSp>
+        <p:nvCxnSpPr>
+          <p:cNvPr id="29" name="Straight Arrow Connector 28"/>
+          <p:cNvCxnSpPr/>
+          <p:nvPr/>
+        </p:nvCxnSpPr>
+        <p:spPr>
+          <a:xfrm flipV="1">
+            <a:off x="1600200" y="3429000"/>
+            <a:ext cx="273050" cy="1"/>
+          </a:xfrm>
+          <a:prstGeom prst="straightConnector1">
+            <a:avLst/>
+          </a:prstGeom>
+          <a:ln w="28575">
+            <a:solidFill>
+              <a:schemeClr val="tx1"/>
+            </a:solidFill>
+            <a:prstDash val="sysDot"/>
+            <a:tailEnd type="arrow"/>
+          </a:ln>
+        </p:spPr>
+        <p:style>
+          <a:lnRef idx="1">
+            <a:schemeClr val="accent1"/>
+          </a:lnRef>
+          <a:fillRef idx="0">
+            <a:schemeClr val="accent1"/>
+          </a:fillRef>
+          <a:effectRef idx="0">
+            <a:schemeClr val="accent1"/>
+          </a:effectRef>
+          <a:fontRef idx="minor">
+            <a:schemeClr val="tx1"/>
+          </a:fontRef>
+        </p:style>
+      </p:cxnSp>
+      <p:sp>
+        <p:nvSpPr>
+          <p:cNvPr id="30" name="Rectangle 45"/>
           <p:cNvSpPr/>
           <p:nvPr/>
         </p:nvSpPr>
         <p:spPr>
           <a:xfrm>
-            <a:off x="3733800" y="2590800"/>
-            <a:ext cx="990600" cy="381000"/>
+            <a:off x="3352800" y="3200400"/>
+            <a:ext cx="1295400" cy="552022"/>
           </a:xfrm>
           <a:prstGeom prst="roundRect">
             <a:avLst/>
@@ -5231,12 +6629,12 @@
           <a:p>
             <a:pPr algn="ctr"/>
             <a:r>
-              <a:rPr lang="en-US" sz="1600" dirty="0" smtClean="0">
+              <a:rPr lang="en-US" sz="1600" dirty="0">
                 <a:solidFill>
                   <a:schemeClr val="bg1"/>
                 </a:solidFill>
               </a:rPr>
-              <a:t>Event</a:t>
+              <a:t>Logic</a:t>
             </a:r>
             <a:endParaRPr lang="en-SG" sz="1600" dirty="0">
               <a:solidFill>
@@ -5246,26 +6644,342 @@
           </a:p>
         </p:txBody>
       </p:sp>
-      <p:sp>
-        <p:nvSpPr>
-          <p:cNvPr id="11" name="Rectangle 45"/>
+      <p:cxnSp>
+        <p:nvCxnSpPr>
+          <p:cNvPr id="31" name="Straight Arrow Connector 30"/>
+          <p:cNvCxnSpPr>
+            <a:endCxn id="30" idx="1"/>
+          </p:cNvCxnSpPr>
+          <p:nvPr/>
+        </p:nvCxnSpPr>
+        <p:spPr>
+          <a:xfrm>
+            <a:off x="2514602" y="3476411"/>
+            <a:ext cx="838198" cy="0"/>
+          </a:xfrm>
+          <a:prstGeom prst="straightConnector1">
+            <a:avLst/>
+          </a:prstGeom>
+          <a:ln w="28575">
+            <a:solidFill>
+              <a:srgbClr val="00B050"/>
+            </a:solidFill>
+            <a:tailEnd type="arrow"/>
+          </a:ln>
+        </p:spPr>
+        <p:style>
+          <a:lnRef idx="1">
+            <a:schemeClr val="accent1"/>
+          </a:lnRef>
+          <a:fillRef idx="0">
+            <a:schemeClr val="accent1"/>
+          </a:fillRef>
+          <a:effectRef idx="0">
+            <a:schemeClr val="accent1"/>
+          </a:effectRef>
+          <a:fontRef idx="minor">
+            <a:schemeClr val="tx1"/>
+          </a:fontRef>
+        </p:style>
+      </p:cxnSp>
+      <p:sp>
+        <p:nvSpPr>
+          <p:cNvPr id="32" name="Rectangle 11"/>
           <p:cNvSpPr/>
           <p:nvPr/>
         </p:nvSpPr>
         <p:spPr>
-          <a:xfrm>
-            <a:off x="3733800" y="3276600"/>
-            <a:ext cx="990600" cy="381000"/>
+          <a:xfrm flipH="1">
+            <a:off x="2819400" y="2286000"/>
+            <a:ext cx="1093635" cy="346760"/>
+          </a:xfrm>
+          <a:prstGeom prst="rect">
+            <a:avLst/>
+          </a:prstGeom>
+          <a:ln w="19050">
+            <a:solidFill>
+              <a:srgbClr val="0070C0"/>
+            </a:solidFill>
+          </a:ln>
+          <a:effectLst/>
+        </p:spPr>
+        <p:style>
+          <a:lnRef idx="1">
+            <a:schemeClr val="accent1"/>
+          </a:lnRef>
+          <a:fillRef idx="2">
+            <a:schemeClr val="accent1"/>
+          </a:fillRef>
+          <a:effectRef idx="1">
+            <a:schemeClr val="accent1"/>
+          </a:effectRef>
+          <a:fontRef idx="minor">
+            <a:schemeClr val="dk1"/>
+          </a:fontRef>
+        </p:style>
+        <p:txBody>
+          <a:bodyPr rtlCol="0" anchor="ctr"/>
+          <a:lstStyle/>
+          <a:p>
+            <a:pPr algn="ctr"/>
+            <a:r>
+              <a:rPr lang="en-US" sz="1050" b="1" dirty="0" err="1" smtClean="0">
+                <a:solidFill>
+                  <a:srgbClr val="0070C0"/>
+                </a:solidFill>
+              </a:rPr>
+              <a:t>Config</a:t>
+            </a:r>
+            <a:endParaRPr lang="en-US" sz="1050" b="1" dirty="0" smtClean="0">
+              <a:solidFill>
+                <a:srgbClr val="0070C0"/>
+              </a:solidFill>
+            </a:endParaRPr>
+          </a:p>
+          <a:p>
+            <a:pPr algn="ctr"/>
+            <a:r>
+              <a:rPr lang="en-US" sz="1050" b="1" dirty="0" smtClean="0">
+                <a:solidFill>
+                  <a:srgbClr val="0070C0"/>
+                </a:solidFill>
+              </a:rPr>
+              <a:t>Command</a:t>
+            </a:r>
+            <a:endParaRPr lang="en-SG" sz="1050" b="1" dirty="0">
+              <a:solidFill>
+                <a:srgbClr val="0070C0"/>
+              </a:solidFill>
+            </a:endParaRPr>
+          </a:p>
+        </p:txBody>
+      </p:sp>
+      <p:sp>
+        <p:nvSpPr>
+          <p:cNvPr id="33" name="Rectangle 11"/>
+          <p:cNvSpPr/>
+          <p:nvPr/>
+        </p:nvSpPr>
+        <p:spPr>
+          <a:xfrm flipH="1">
+            <a:off x="4114800" y="2286000"/>
+            <a:ext cx="1093635" cy="346760"/>
+          </a:xfrm>
+          <a:prstGeom prst="rect">
+            <a:avLst/>
+          </a:prstGeom>
+          <a:ln w="19050">
+            <a:solidFill>
+              <a:srgbClr val="0070C0"/>
+            </a:solidFill>
+          </a:ln>
+          <a:effectLst/>
+        </p:spPr>
+        <p:style>
+          <a:lnRef idx="1">
+            <a:schemeClr val="accent1"/>
+          </a:lnRef>
+          <a:fillRef idx="2">
+            <a:schemeClr val="accent1"/>
+          </a:fillRef>
+          <a:effectRef idx="1">
+            <a:schemeClr val="accent1"/>
+          </a:effectRef>
+          <a:fontRef idx="minor">
+            <a:schemeClr val="dk1"/>
+          </a:fontRef>
+        </p:style>
+        <p:txBody>
+          <a:bodyPr rtlCol="0" anchor="ctr"/>
+          <a:lstStyle/>
+          <a:p>
+            <a:pPr algn="ctr"/>
+            <a:r>
+              <a:rPr lang="en-US" sz="1050" b="1" dirty="0" err="1" smtClean="0">
+                <a:solidFill>
+                  <a:srgbClr val="0070C0"/>
+                </a:solidFill>
+              </a:rPr>
+              <a:t>Cd</a:t>
+            </a:r>
+            <a:endParaRPr lang="en-US" sz="1050" b="1" dirty="0" smtClean="0">
+              <a:solidFill>
+                <a:srgbClr val="0070C0"/>
+              </a:solidFill>
+            </a:endParaRPr>
+          </a:p>
+          <a:p>
+            <a:pPr algn="ctr"/>
+            <a:r>
+              <a:rPr lang="en-US" sz="1050" b="1" dirty="0" smtClean="0">
+                <a:solidFill>
+                  <a:srgbClr val="0070C0"/>
+                </a:solidFill>
+              </a:rPr>
+              <a:t>Command</a:t>
+            </a:r>
+            <a:endParaRPr lang="en-SG" sz="1050" b="1" dirty="0">
+              <a:solidFill>
+                <a:srgbClr val="0070C0"/>
+              </a:solidFill>
+            </a:endParaRPr>
+          </a:p>
+        </p:txBody>
+      </p:sp>
+      <p:sp>
+        <p:nvSpPr>
+          <p:cNvPr id="34" name="Isosceles Triangle 102"/>
+          <p:cNvSpPr/>
+          <p:nvPr/>
+        </p:nvSpPr>
+        <p:spPr>
+          <a:xfrm rot="10800000">
+            <a:off x="3890765" y="3055213"/>
+            <a:ext cx="270504" cy="175523"/>
+          </a:xfrm>
+          <a:prstGeom prst="triangle">
+            <a:avLst/>
+          </a:prstGeom>
+          <a:solidFill>
+            <a:schemeClr val="tx2">
+              <a:lumMod val="60000"/>
+              <a:lumOff val="40000"/>
+            </a:schemeClr>
+          </a:solidFill>
+          <a:ln w="19050">
+            <a:solidFill>
+              <a:srgbClr val="0070C0"/>
+            </a:solidFill>
+          </a:ln>
+          <a:effectLst/>
+        </p:spPr>
+        <p:style>
+          <a:lnRef idx="1">
+            <a:schemeClr val="accent1"/>
+          </a:lnRef>
+          <a:fillRef idx="2">
+            <a:schemeClr val="accent1"/>
+          </a:fillRef>
+          <a:effectRef idx="1">
+            <a:schemeClr val="accent1"/>
+          </a:effectRef>
+          <a:fontRef idx="minor">
+            <a:schemeClr val="dk1"/>
+          </a:fontRef>
+        </p:style>
+        <p:txBody>
+          <a:bodyPr rtlCol="0" anchor="ctr"/>
+          <a:lstStyle/>
+          <a:p>
+            <a:pPr algn="ctr"/>
+            <a:endParaRPr lang="en-SG" sz="1050" b="1">
+              <a:solidFill>
+                <a:srgbClr val="92D050"/>
+              </a:solidFill>
+            </a:endParaRPr>
+          </a:p>
+        </p:txBody>
+      </p:sp>
+      <p:cxnSp>
+        <p:nvCxnSpPr>
+          <p:cNvPr id="41" name="Elbow Connector 40"/>
+          <p:cNvCxnSpPr>
+            <a:stCxn id="33" idx="2"/>
+            <a:endCxn id="34" idx="3"/>
+          </p:cNvCxnSpPr>
+          <p:nvPr/>
+        </p:nvCxnSpPr>
+        <p:spPr>
+          <a:xfrm rot="5400000">
+            <a:off x="4132591" y="2526186"/>
+            <a:ext cx="422453" cy="635600"/>
+          </a:xfrm>
+          <a:prstGeom prst="bentConnector3">
+            <a:avLst>
+              <a:gd name="adj1" fmla="val 50000"/>
+            </a:avLst>
+          </a:prstGeom>
+          <a:ln>
+            <a:prstDash val="sysDot"/>
+          </a:ln>
+        </p:spPr>
+        <p:style>
+          <a:lnRef idx="1">
+            <a:schemeClr val="accent1"/>
+          </a:lnRef>
+          <a:fillRef idx="0">
+            <a:schemeClr val="accent1"/>
+          </a:fillRef>
+          <a:effectRef idx="0">
+            <a:schemeClr val="accent1"/>
+          </a:effectRef>
+          <a:fontRef idx="minor">
+            <a:schemeClr val="tx1"/>
+          </a:fontRef>
+        </p:style>
+      </p:cxnSp>
+      <p:cxnSp>
+        <p:nvCxnSpPr>
+          <p:cNvPr id="42" name="Elbow Connector 41"/>
+          <p:cNvCxnSpPr>
+            <a:stCxn id="32" idx="2"/>
+            <a:endCxn id="34" idx="3"/>
+          </p:cNvCxnSpPr>
+          <p:nvPr/>
+        </p:nvCxnSpPr>
+        <p:spPr>
+          <a:xfrm rot="16200000" flipH="1">
+            <a:off x="3484891" y="2514086"/>
+            <a:ext cx="422453" cy="659800"/>
+          </a:xfrm>
+          <a:prstGeom prst="bentConnector3">
+            <a:avLst>
+              <a:gd name="adj1" fmla="val 50000"/>
+            </a:avLst>
+          </a:prstGeom>
+          <a:ln>
+            <a:prstDash val="sysDot"/>
+          </a:ln>
+        </p:spPr>
+        <p:style>
+          <a:lnRef idx="1">
+            <a:schemeClr val="accent1"/>
+          </a:lnRef>
+          <a:fillRef idx="0">
+            <a:schemeClr val="accent1"/>
+          </a:fillRef>
+          <a:effectRef idx="0">
+            <a:schemeClr val="accent1"/>
+          </a:effectRef>
+          <a:fontRef idx="minor">
+            <a:schemeClr val="tx1"/>
+          </a:fontRef>
+        </p:style>
+      </p:cxnSp>
+      <p:sp>
+        <p:nvSpPr>
+          <p:cNvPr id="46" name="Rectangle 45"/>
+          <p:cNvSpPr/>
+          <p:nvPr/>
+        </p:nvSpPr>
+        <p:spPr>
+          <a:xfrm>
+            <a:off x="5029200" y="3200400"/>
+            <a:ext cx="1447800" cy="552022"/>
           </a:xfrm>
           <a:prstGeom prst="roundRect">
             <a:avLst/>
           </a:prstGeom>
           <a:solidFill>
-            <a:srgbClr val="0070C0"/>
+            <a:schemeClr val="accent6">
+              <a:lumMod val="75000"/>
+            </a:schemeClr>
           </a:solidFill>
           <a:ln w="19050">
             <a:solidFill>
-              <a:srgbClr val="0070C0"/>
+              <a:schemeClr val="accent6">
+                <a:lumMod val="75000"/>
+              </a:schemeClr>
             </a:solidFill>
           </a:ln>
           <a:effectLst/>
@@ -5290,12 +7004,12 @@
           <a:p>
             <a:pPr algn="ctr"/>
             <a:r>
-              <a:rPr lang="en-US" sz="1600" dirty="0" smtClean="0">
+              <a:rPr lang="en-US" sz="1600" dirty="0">
                 <a:solidFill>
                   <a:schemeClr val="bg1"/>
                 </a:solidFill>
               </a:rPr>
-              <a:t>Deadline</a:t>
+              <a:t>Storage</a:t>
             </a:r>
             <a:endParaRPr lang="en-SG" sz="1600" dirty="0">
               <a:solidFill>
@@ -5305,42 +7019,85 @@
           </a:p>
         </p:txBody>
       </p:sp>
-      <p:sp>
-        <p:nvSpPr>
-          <p:cNvPr id="12" name="Rectangle 45"/>
+      <p:cxnSp>
+        <p:nvCxnSpPr>
+          <p:cNvPr id="47" name="Straight Arrow Connector 46"/>
+          <p:cNvCxnSpPr>
+            <a:stCxn id="46" idx="3"/>
+            <a:endCxn id="48" idx="1"/>
+          </p:cNvCxnSpPr>
+          <p:nvPr/>
+        </p:nvCxnSpPr>
+        <p:spPr>
+          <a:xfrm>
+            <a:off x="6477000" y="3476411"/>
+            <a:ext cx="990600" cy="562189"/>
+          </a:xfrm>
+          <a:prstGeom prst="straightConnector1">
+            <a:avLst/>
+          </a:prstGeom>
+          <a:ln w="28575">
+            <a:solidFill>
+              <a:schemeClr val="accent6">
+                <a:lumMod val="75000"/>
+              </a:schemeClr>
+            </a:solidFill>
+            <a:prstDash val="sysDot"/>
+            <a:tailEnd type="arrow"/>
+          </a:ln>
+        </p:spPr>
+        <p:style>
+          <a:lnRef idx="1">
+            <a:schemeClr val="accent1"/>
+          </a:lnRef>
+          <a:fillRef idx="0">
+            <a:schemeClr val="accent1"/>
+          </a:fillRef>
+          <a:effectRef idx="0">
+            <a:schemeClr val="accent1"/>
+          </a:effectRef>
+          <a:fontRef idx="minor">
+            <a:schemeClr val="tx1"/>
+          </a:fontRef>
+        </p:style>
+      </p:cxnSp>
+      <p:sp>
+        <p:nvSpPr>
+          <p:cNvPr id="48" name="Folded Corner 47"/>
           <p:cNvSpPr/>
           <p:nvPr/>
         </p:nvSpPr>
         <p:spPr>
           <a:xfrm>
-            <a:off x="5486400" y="2590800"/>
-            <a:ext cx="914400" cy="381000"/>
-          </a:xfrm>
-          <a:prstGeom prst="roundRect">
+            <a:off x="7467600" y="3810000"/>
+            <a:ext cx="1371600" cy="457200"/>
+          </a:xfrm>
+          <a:prstGeom prst="foldedCorner">
             <a:avLst/>
           </a:prstGeom>
           <a:solidFill>
-            <a:srgbClr val="0070C0"/>
+            <a:schemeClr val="bg1"/>
           </a:solidFill>
-          <a:ln w="19050">
-            <a:solidFill>
-              <a:srgbClr val="0070C0"/>
-            </a:solidFill>
-          </a:ln>
-          <a:effectLst/>
-        </p:spPr>
-        <p:style>
-          <a:lnRef idx="1">
-            <a:schemeClr val="accent5"/>
-          </a:lnRef>
-          <a:fillRef idx="2">
-            <a:schemeClr val="accent5"/>
-          </a:fillRef>
-          <a:effectRef idx="1">
-            <a:schemeClr val="accent5"/>
-          </a:effectRef>
-          <a:fontRef idx="minor">
-            <a:schemeClr val="dk1"/>
+          <a:ln>
+            <a:solidFill>
+              <a:schemeClr val="tx1"/>
+            </a:solidFill>
+          </a:ln>
+        </p:spPr>
+        <p:style>
+          <a:lnRef idx="2">
+            <a:schemeClr val="accent1">
+              <a:shade val="50000"/>
+            </a:schemeClr>
+          </a:lnRef>
+          <a:fillRef idx="1">
+            <a:schemeClr val="accent1"/>
+          </a:fillRef>
+          <a:effectRef idx="0">
+            <a:schemeClr val="accent1"/>
+          </a:effectRef>
+          <a:fontRef idx="minor">
+            <a:schemeClr val="lt1"/>
           </a:fontRef>
         </p:style>
         <p:txBody>
@@ -5349,39 +7106,105 @@
           <a:p>
             <a:pPr algn="ctr"/>
             <a:r>
-              <a:rPr lang="en-US" sz="1600" dirty="0" smtClean="0">
-                <a:solidFill>
-                  <a:schemeClr val="bg1"/>
+              <a:rPr lang="en-US" dirty="0" err="1" smtClean="0">
+                <a:solidFill>
+                  <a:sysClr val="windowText" lastClr="000000"/>
                 </a:solidFill>
               </a:rPr>
-              <a:t>Block</a:t>
-            </a:r>
-            <a:endParaRPr lang="en-SG" sz="1600" dirty="0">
+              <a:t>Config.json</a:t>
+            </a:r>
+            <a:endParaRPr lang="en-US" dirty="0">
               <a:solidFill>
-                <a:schemeClr val="bg1"/>
+                <a:sysClr val="windowText" lastClr="000000"/>
               </a:solidFill>
             </a:endParaRPr>
           </a:p>
         </p:txBody>
       </p:sp>
+      <p:sp>
+        <p:nvSpPr>
+          <p:cNvPr id="49" name="Folded Corner 48"/>
+          <p:cNvSpPr/>
+          <p:nvPr/>
+        </p:nvSpPr>
+        <p:spPr>
+          <a:xfrm>
+            <a:off x="7467600" y="2514600"/>
+            <a:ext cx="1447800" cy="609600"/>
+          </a:xfrm>
+          <a:prstGeom prst="foldedCorner">
+            <a:avLst/>
+          </a:prstGeom>
+          <a:solidFill>
+            <a:schemeClr val="bg1"/>
+          </a:solidFill>
+          <a:ln>
+            <a:solidFill>
+              <a:schemeClr val="tx1"/>
+            </a:solidFill>
+          </a:ln>
+        </p:spPr>
+        <p:style>
+          <a:lnRef idx="2">
+            <a:schemeClr val="accent1">
+              <a:shade val="50000"/>
+            </a:schemeClr>
+          </a:lnRef>
+          <a:fillRef idx="1">
+            <a:schemeClr val="accent1"/>
+          </a:fillRef>
+          <a:effectRef idx="0">
+            <a:schemeClr val="accent1"/>
+          </a:effectRef>
+          <a:fontRef idx="minor">
+            <a:schemeClr val="lt1"/>
+          </a:fontRef>
+        </p:style>
+        <p:txBody>
+          <a:bodyPr rtlCol="0" anchor="ctr"/>
+          <a:lstStyle/>
+          <a:p>
+            <a:pPr algn="ctr"/>
+            <a:r>
+              <a:rPr lang="en-US" dirty="0" smtClean="0">
+                <a:solidFill>
+                  <a:sysClr val="windowText" lastClr="000000"/>
+                </a:solidFill>
+              </a:rPr>
+              <a:t>saveData.xml</a:t>
+            </a:r>
+            <a:endParaRPr lang="en-US" dirty="0">
+              <a:solidFill>
+                <a:sysClr val="windowText" lastClr="000000"/>
+              </a:solidFill>
+            </a:endParaRPr>
+          </a:p>
+        </p:txBody>
+      </p:sp>
       <p:cxnSp>
         <p:nvCxnSpPr>
-          <p:cNvPr id="14" name="Straight Arrow Connector 13"/>
+          <p:cNvPr id="50" name="Straight Arrow Connector 49"/>
           <p:cNvCxnSpPr>
-            <a:stCxn id="11" idx="1"/>
-            <a:endCxn id="4" idx="3"/>
+            <a:stCxn id="46" idx="3"/>
+            <a:endCxn id="49" idx="1"/>
           </p:cNvCxnSpPr>
           <p:nvPr/>
         </p:nvCxnSpPr>
         <p:spPr>
-          <a:xfrm flipH="1">
-            <a:off x="2895600" y="3467100"/>
-            <a:ext cx="838200" cy="0"/>
+          <a:xfrm flipV="1">
+            <a:off x="6477000" y="2819400"/>
+            <a:ext cx="990600" cy="657011"/>
           </a:xfrm>
           <a:prstGeom prst="straightConnector1">
             <a:avLst/>
           </a:prstGeom>
-          <a:ln>
+          <a:ln w="28575">
+            <a:solidFill>
+              <a:schemeClr val="accent6">
+                <a:lumMod val="75000"/>
+              </a:schemeClr>
+            </a:solidFill>
+            <a:prstDash val="sysDot"/>
             <a:tailEnd type="arrow"/>
           </a:ln>
         </p:spPr>
@@ -5402,60 +7225,24 @@
       </p:cxnSp>
       <p:cxnSp>
         <p:nvCxnSpPr>
-          <p:cNvPr id="20" name="Elbow Connector 19"/>
+          <p:cNvPr id="58" name="Straight Arrow Connector 57"/>
           <p:cNvCxnSpPr>
-            <a:stCxn id="10" idx="1"/>
-            <a:endCxn id="4" idx="3"/>
+            <a:endCxn id="46" idx="1"/>
           </p:cNvCxnSpPr>
           <p:nvPr/>
         </p:nvCxnSpPr>
         <p:spPr>
-          <a:xfrm rot="10800000" flipV="1">
-            <a:off x="2895600" y="2781300"/>
-            <a:ext cx="838200" cy="685800"/>
-          </a:xfrm>
-          <a:prstGeom prst="bentConnector3">
-            <a:avLst>
-              <a:gd name="adj1" fmla="val 50000"/>
-            </a:avLst>
-          </a:prstGeom>
-          <a:ln>
-            <a:tailEnd type="arrow"/>
-          </a:ln>
-        </p:spPr>
-        <p:style>
-          <a:lnRef idx="1">
-            <a:schemeClr val="accent1"/>
-          </a:lnRef>
-          <a:fillRef idx="0">
-            <a:schemeClr val="accent1"/>
-          </a:fillRef>
-          <a:effectRef idx="0">
-            <a:schemeClr val="accent1"/>
-          </a:effectRef>
-          <a:fontRef idx="minor">
-            <a:schemeClr val="tx1"/>
-          </a:fontRef>
-        </p:style>
-      </p:cxnSp>
-      <p:cxnSp>
-        <p:nvCxnSpPr>
-          <p:cNvPr id="24" name="Straight Arrow Connector 23"/>
-          <p:cNvCxnSpPr>
-            <a:stCxn id="12" idx="1"/>
-            <a:endCxn id="10" idx="3"/>
-          </p:cNvCxnSpPr>
-          <p:nvPr/>
-        </p:nvCxnSpPr>
-        <p:spPr>
-          <a:xfrm flipH="1">
-            <a:off x="4724400" y="2781300"/>
-            <a:ext cx="762000" cy="0"/>
+          <a:xfrm flipV="1">
+            <a:off x="4648200" y="3476411"/>
+            <a:ext cx="381000" cy="28789"/>
           </a:xfrm>
           <a:prstGeom prst="straightConnector1">
             <a:avLst/>
           </a:prstGeom>
-          <a:ln>
+          <a:ln w="28575">
+            <a:solidFill>
+              <a:srgbClr val="0070C0"/>
+            </a:solidFill>
             <a:tailEnd type="arrow"/>
           </a:ln>
         </p:spPr>
@@ -6727,7 +8514,7 @@
     </p:spTree>
     <p:extLst>
       <p:ext uri="{BB962C8B-B14F-4D97-AF65-F5344CB8AC3E}">
-        <p14:creationId xmlns:p14="http://schemas.microsoft.com/office/powerpoint/2010/main" val="1981432603"/>
+        <p14:creationId xmlns:p14="http://schemas.microsoft.com/office/powerpoint/2010/main" xmlns="" val="1981432603"/>
       </p:ext>
     </p:extLst>
   </p:cSld>
@@ -9350,7 +11137,7 @@
     </p:spTree>
     <p:extLst>
       <p:ext uri="{BB962C8B-B14F-4D97-AF65-F5344CB8AC3E}">
-        <p14:creationId xmlns:p14="http://schemas.microsoft.com/office/powerpoint/2010/main" val="1434580780"/>
+        <p14:creationId xmlns:p14="http://schemas.microsoft.com/office/powerpoint/2010/main" xmlns="" val="1434580780"/>
       </p:ext>
     </p:extLst>
   </p:cSld>
@@ -11537,7 +13324,7 @@
     </p:spTree>
     <p:extLst>
       <p:ext uri="{BB962C8B-B14F-4D97-AF65-F5344CB8AC3E}">
-        <p14:creationId xmlns:p14="http://schemas.microsoft.com/office/powerpoint/2010/main" val="4023378879"/>
+        <p14:creationId xmlns:p14="http://schemas.microsoft.com/office/powerpoint/2010/main" xmlns="" val="4023378879"/>
       </p:ext>
     </p:extLst>
   </p:cSld>
@@ -13333,7 +15120,7 @@
     </p:spTree>
     <p:extLst>
       <p:ext uri="{BB962C8B-B14F-4D97-AF65-F5344CB8AC3E}">
-        <p14:creationId xmlns:p14="http://schemas.microsoft.com/office/powerpoint/2010/main" val="363914971"/>
+        <p14:creationId xmlns:p14="http://schemas.microsoft.com/office/powerpoint/2010/main" xmlns="" val="363914971"/>
       </p:ext>
     </p:extLst>
   </p:cSld>
@@ -13376,7 +15163,7 @@
         <p:spPr>
           <a:xfrm>
             <a:off x="1217465" y="1447800"/>
-            <a:ext cx="4917083" cy="3962400"/>
+            <a:ext cx="4917083" cy="4572000"/>
           </a:xfrm>
           <a:prstGeom prst="roundRect">
             <a:avLst>
@@ -13870,7 +15657,7 @@
         </p:nvSpPr>
         <p:spPr>
           <a:xfrm>
-            <a:off x="2592527" y="4563759"/>
+            <a:off x="2590800" y="5105400"/>
             <a:ext cx="1093635" cy="236841"/>
           </a:xfrm>
           <a:prstGeom prst="rect">
@@ -14050,7 +15837,7 @@
         </p:nvSpPr>
         <p:spPr>
           <a:xfrm>
-            <a:off x="2592528" y="4966000"/>
+            <a:off x="2590800" y="5486400"/>
             <a:ext cx="1093635" cy="236841"/>
           </a:xfrm>
           <a:prstGeom prst="rect">
@@ -14344,8 +16131,8 @@
         </p:nvCxnSpPr>
         <p:spPr>
           <a:xfrm rot="16200000" flipH="1">
-            <a:off x="1597249" y="3686901"/>
-            <a:ext cx="1814155" cy="176401"/>
+            <a:off x="1325565" y="3958586"/>
+            <a:ext cx="2355796" cy="174674"/>
           </a:xfrm>
           <a:prstGeom prst="bentConnector2">
             <a:avLst/>
@@ -14384,7 +16171,7 @@
         </p:nvCxnSpPr>
         <p:spPr>
           <a:xfrm rot="16200000" flipH="1">
-            <a:off x="1184119" y="3676012"/>
+            <a:off x="1182391" y="4196412"/>
             <a:ext cx="2396440" cy="420377"/>
           </a:xfrm>
           <a:prstGeom prst="bentConnector2">
@@ -14668,8 +16455,8 @@
         </p:nvCxnSpPr>
         <p:spPr>
           <a:xfrm rot="5400000">
-            <a:off x="3409976" y="2562187"/>
-            <a:ext cx="2396180" cy="1843807"/>
+            <a:off x="3138292" y="2832143"/>
+            <a:ext cx="2937821" cy="1845534"/>
           </a:xfrm>
           <a:prstGeom prst="bentConnector2">
             <a:avLst/>
@@ -14709,8 +16496,8 @@
         </p:nvCxnSpPr>
         <p:spPr>
           <a:xfrm rot="5400000">
-            <a:off x="3208856" y="2763307"/>
-            <a:ext cx="2798421" cy="1843806"/>
+            <a:off x="2947792" y="3022643"/>
+            <a:ext cx="3318821" cy="1845534"/>
           </a:xfrm>
           <a:prstGeom prst="bentConnector2">
             <a:avLst/>
@@ -15572,10 +17359,291 @@
           </a:p>
         </p:txBody>
       </p:sp>
+      <p:sp>
+        <p:nvSpPr>
+          <p:cNvPr id="51" name="Rectangle 11"/>
+          <p:cNvSpPr/>
+          <p:nvPr/>
+        </p:nvSpPr>
+        <p:spPr>
+          <a:xfrm>
+            <a:off x="2590800" y="4572000"/>
+            <a:ext cx="1093635" cy="236841"/>
+          </a:xfrm>
+          <a:prstGeom prst="rect">
+            <a:avLst/>
+          </a:prstGeom>
+          <a:ln w="19050">
+            <a:solidFill>
+              <a:schemeClr val="accent3"/>
+            </a:solidFill>
+          </a:ln>
+          <a:effectLst/>
+        </p:spPr>
+        <p:style>
+          <a:lnRef idx="1">
+            <a:schemeClr val="accent3"/>
+          </a:lnRef>
+          <a:fillRef idx="2">
+            <a:schemeClr val="accent3"/>
+          </a:fillRef>
+          <a:effectRef idx="1">
+            <a:schemeClr val="accent3"/>
+          </a:effectRef>
+          <a:fontRef idx="minor">
+            <a:schemeClr val="dk1"/>
+          </a:fontRef>
+        </p:style>
+        <p:txBody>
+          <a:bodyPr rtlCol="0" anchor="ctr"/>
+          <a:lstStyle/>
+          <a:p>
+            <a:pPr algn="ctr"/>
+            <a:r>
+              <a:rPr lang="en-US" sz="1050" b="1" dirty="0" err="1" smtClean="0">
+                <a:solidFill>
+                  <a:schemeClr val="accent3">
+                    <a:lumMod val="75000"/>
+                  </a:schemeClr>
+                </a:solidFill>
+              </a:rPr>
+              <a:t>EventListPanel</a:t>
+            </a:r>
+            <a:endParaRPr lang="en-SG" sz="1050" b="1" dirty="0">
+              <a:solidFill>
+                <a:schemeClr val="accent3">
+                  <a:lumMod val="75000"/>
+                </a:schemeClr>
+              </a:solidFill>
+            </a:endParaRPr>
+          </a:p>
+        </p:txBody>
+      </p:sp>
+      <p:cxnSp>
+        <p:nvCxnSpPr>
+          <p:cNvPr id="52" name="Elbow Connector 63"/>
+          <p:cNvCxnSpPr>
+            <a:stCxn id="39" idx="2"/>
+            <a:endCxn id="51" idx="1"/>
+          </p:cNvCxnSpPr>
+          <p:nvPr/>
+        </p:nvCxnSpPr>
+        <p:spPr>
+          <a:xfrm rot="16200000" flipH="1">
+            <a:off x="1592265" y="3691886"/>
+            <a:ext cx="1822396" cy="174674"/>
+          </a:xfrm>
+          <a:prstGeom prst="bentConnector2">
+            <a:avLst/>
+          </a:prstGeom>
+          <a:ln w="19050">
+            <a:solidFill>
+              <a:schemeClr val="accent3"/>
+            </a:solidFill>
+            <a:headEnd type="none" w="med" len="med"/>
+            <a:tailEnd type="arrow" w="med" len="med"/>
+          </a:ln>
+          <a:effectLst/>
+        </p:spPr>
+        <p:style>
+          <a:lnRef idx="1">
+            <a:schemeClr val="accent2"/>
+          </a:lnRef>
+          <a:fillRef idx="2">
+            <a:schemeClr val="accent2"/>
+          </a:fillRef>
+          <a:effectRef idx="1">
+            <a:schemeClr val="accent2"/>
+          </a:effectRef>
+          <a:fontRef idx="minor">
+            <a:schemeClr val="dk1"/>
+          </a:fontRef>
+        </p:style>
+      </p:cxnSp>
+      <p:sp>
+        <p:nvSpPr>
+          <p:cNvPr id="57" name="Rectangle 11"/>
+          <p:cNvSpPr/>
+          <p:nvPr/>
+        </p:nvSpPr>
+        <p:spPr>
+          <a:xfrm>
+            <a:off x="3810000" y="4800600"/>
+            <a:ext cx="1040906" cy="236841"/>
+          </a:xfrm>
+          <a:prstGeom prst="rect">
+            <a:avLst/>
+          </a:prstGeom>
+          <a:ln w="19050">
+            <a:solidFill>
+              <a:schemeClr val="accent3"/>
+            </a:solidFill>
+          </a:ln>
+          <a:effectLst/>
+        </p:spPr>
+        <p:style>
+          <a:lnRef idx="1">
+            <a:schemeClr val="accent3"/>
+          </a:lnRef>
+          <a:fillRef idx="2">
+            <a:schemeClr val="accent3"/>
+          </a:fillRef>
+          <a:effectRef idx="1">
+            <a:schemeClr val="accent3"/>
+          </a:effectRef>
+          <a:fontRef idx="minor">
+            <a:schemeClr val="dk1"/>
+          </a:fontRef>
+        </p:style>
+        <p:txBody>
+          <a:bodyPr rtlCol="0" anchor="ctr"/>
+          <a:lstStyle/>
+          <a:p>
+            <a:pPr algn="ctr"/>
+            <a:r>
+              <a:rPr lang="en-US" sz="1050" b="1" dirty="0" err="1">
+                <a:solidFill>
+                  <a:schemeClr val="accent3">
+                    <a:lumMod val="75000"/>
+                  </a:schemeClr>
+                </a:solidFill>
+              </a:rPr>
+              <a:t>TaskCard</a:t>
+            </a:r>
+            <a:endParaRPr lang="en-SG" sz="1050" b="1" dirty="0">
+              <a:solidFill>
+                <a:schemeClr val="accent3">
+                  <a:lumMod val="75000"/>
+                </a:schemeClr>
+              </a:solidFill>
+            </a:endParaRPr>
+          </a:p>
+        </p:txBody>
+      </p:sp>
+      <p:cxnSp>
+        <p:nvCxnSpPr>
+          <p:cNvPr id="58" name="Elbow Connector 136"/>
+          <p:cNvCxnSpPr/>
+          <p:nvPr/>
+        </p:nvCxnSpPr>
+        <p:spPr>
+          <a:xfrm rot="16200000" flipH="1">
+            <a:off x="3414979" y="4509821"/>
+            <a:ext cx="118421" cy="699979"/>
+          </a:xfrm>
+          <a:prstGeom prst="bentConnector2">
+            <a:avLst/>
+          </a:prstGeom>
+          <a:ln w="19050">
+            <a:solidFill>
+              <a:schemeClr val="accent3"/>
+            </a:solidFill>
+            <a:headEnd type="none" w="med" len="med"/>
+            <a:tailEnd type="arrow" w="med" len="med"/>
+          </a:ln>
+          <a:effectLst/>
+        </p:spPr>
+        <p:style>
+          <a:lnRef idx="1">
+            <a:schemeClr val="accent2"/>
+          </a:lnRef>
+          <a:fillRef idx="2">
+            <a:schemeClr val="accent2"/>
+          </a:fillRef>
+          <a:effectRef idx="1">
+            <a:schemeClr val="accent2"/>
+          </a:effectRef>
+          <a:fontRef idx="minor">
+            <a:schemeClr val="dk1"/>
+          </a:fontRef>
+        </p:style>
+      </p:cxnSp>
+      <p:sp>
+        <p:nvSpPr>
+          <p:cNvPr id="59" name="Freeform 58"/>
+          <p:cNvSpPr/>
+          <p:nvPr/>
+        </p:nvSpPr>
+        <p:spPr>
+          <a:xfrm flipV="1">
+            <a:off x="4114800" y="5105400"/>
+            <a:ext cx="2642195" cy="101600"/>
+          </a:xfrm>
+          <a:custGeom>
+            <a:avLst/>
+            <a:gdLst>
+              <a:gd name="connsiteX0" fmla="*/ 0 w 3048000"/>
+              <a:gd name="connsiteY0" fmla="*/ 203200 h 203200"/>
+              <a:gd name="connsiteX1" fmla="*/ 221673 w 3048000"/>
+              <a:gd name="connsiteY1" fmla="*/ 0 h 203200"/>
+              <a:gd name="connsiteX2" fmla="*/ 3048000 w 3048000"/>
+              <a:gd name="connsiteY2" fmla="*/ 0 h 203200"/>
+            </a:gdLst>
+            <a:ahLst/>
+            <a:cxnLst>
+              <a:cxn ang="0">
+                <a:pos x="connsiteX0" y="connsiteY0"/>
+              </a:cxn>
+              <a:cxn ang="0">
+                <a:pos x="connsiteX1" y="connsiteY1"/>
+              </a:cxn>
+              <a:cxn ang="0">
+                <a:pos x="connsiteX2" y="connsiteY2"/>
+              </a:cxn>
+            </a:cxnLst>
+            <a:rect l="l" t="t" r="r" b="b"/>
+            <a:pathLst>
+              <a:path w="3048000" h="203200">
+                <a:moveTo>
+                  <a:pt x="0" y="203200"/>
+                </a:moveTo>
+                <a:lnTo>
+                  <a:pt x="221673" y="0"/>
+                </a:lnTo>
+                <a:lnTo>
+                  <a:pt x="3048000" y="0"/>
+                </a:lnTo>
+              </a:path>
+            </a:pathLst>
+          </a:custGeom>
+          <a:noFill/>
+          <a:ln w="19050">
+            <a:solidFill>
+              <a:schemeClr val="accent3"/>
+            </a:solidFill>
+            <a:prstDash val="sysDot"/>
+            <a:headEnd type="none" w="med" len="med"/>
+            <a:tailEnd type="arrow" w="med" len="med"/>
+          </a:ln>
+          <a:effectLst/>
+        </p:spPr>
+        <p:style>
+          <a:lnRef idx="1">
+            <a:schemeClr val="accent2"/>
+          </a:lnRef>
+          <a:fillRef idx="2">
+            <a:schemeClr val="accent2"/>
+          </a:fillRef>
+          <a:effectRef idx="1">
+            <a:schemeClr val="accent2"/>
+          </a:effectRef>
+          <a:fontRef idx="minor">
+            <a:schemeClr val="dk1"/>
+          </a:fontRef>
+        </p:style>
+        <p:txBody>
+          <a:bodyPr rtlCol="0" anchor="ctr"/>
+          <a:lstStyle/>
+          <a:p>
+            <a:pPr algn="ctr"/>
+            <a:endParaRPr lang="en-SG"/>
+          </a:p>
+        </p:txBody>
+      </p:sp>
     </p:spTree>
     <p:extLst>
       <p:ext uri="{BB962C8B-B14F-4D97-AF65-F5344CB8AC3E}">
-        <p14:creationId xmlns:p14="http://schemas.microsoft.com/office/powerpoint/2010/main" val="2776882492"/>
+        <p14:creationId xmlns:p14="http://schemas.microsoft.com/office/powerpoint/2010/main" xmlns="" val="2776882492"/>
       </p:ext>
     </p:extLst>
   </p:cSld>
@@ -18189,7 +20257,7 @@
     </p:spTree>
     <p:extLst>
       <p:ext uri="{BB962C8B-B14F-4D97-AF65-F5344CB8AC3E}">
-        <p14:creationId xmlns:p14="http://schemas.microsoft.com/office/powerpoint/2010/main" val="599777654"/>
+        <p14:creationId xmlns:p14="http://schemas.microsoft.com/office/powerpoint/2010/main" xmlns="" val="599777654"/>
       </p:ext>
     </p:extLst>
   </p:cSld>
@@ -20086,7 +22154,7 @@
     </p:spTree>
     <p:extLst>
       <p:ext uri="{BB962C8B-B14F-4D97-AF65-F5344CB8AC3E}">
-        <p14:creationId xmlns:p14="http://schemas.microsoft.com/office/powerpoint/2010/main" val="3945898909"/>
+        <p14:creationId xmlns:p14="http://schemas.microsoft.com/office/powerpoint/2010/main" xmlns="" val="3945898909"/>
       </p:ext>
     </p:extLst>
   </p:cSld>
@@ -20230,7 +22298,7 @@
                   <a:schemeClr val="bg1"/>
                 </a:solidFill>
               </a:rPr>
-              <a:t>Config.json</a:t>
+              <a:t>Config</a:t>
             </a:r>
             <a:endParaRPr lang="en-SG" sz="1050" dirty="0">
               <a:solidFill>
@@ -22890,7 +24958,7 @@
     </p:spTree>
     <p:extLst>
       <p:ext uri="{BB962C8B-B14F-4D97-AF65-F5344CB8AC3E}">
-        <p14:creationId xmlns:p14="http://schemas.microsoft.com/office/powerpoint/2010/main" val="2396968029"/>
+        <p14:creationId xmlns:p14="http://schemas.microsoft.com/office/powerpoint/2010/main" xmlns="" val="2396968029"/>
       </p:ext>
     </p:extLst>
   </p:cSld>

</xml_diff>